<commit_message>
removed fash message at logout, improved assignToDoctor function, changed currentIssues() in Doctor model to numOpenIssues
</commit_message>
<xml_diff>
--- a/FRONT_END/logo_lab/FINAL_presentation.pptx
+++ b/FRONT_END/logo_lab/FINAL_presentation.pptx
@@ -7,8 +7,9 @@
   <p:sldIdLst>
     <p:sldId id="256" r:id="rId2"/>
     <p:sldId id="257" r:id="rId3"/>
-    <p:sldId id="258" r:id="rId4"/>
-    <p:sldId id="259" r:id="rId5"/>
+    <p:sldId id="260" r:id="rId4"/>
+    <p:sldId id="258" r:id="rId5"/>
+    <p:sldId id="259" r:id="rId6"/>
   </p:sldIdLst>
   <p:sldSz cx="9144000" cy="6858000" type="screen4x3"/>
   <p:notesSz cx="6858000" cy="9144000"/>
@@ -3228,8 +3229,8 @@
         </p:nvSpPr>
         <p:spPr>
           <a:xfrm>
-            <a:off x="1484483" y="2045441"/>
-            <a:ext cx="6185343" cy="2308324"/>
+            <a:off x="1072127" y="1798009"/>
+            <a:ext cx="7043044" cy="4524315"/>
           </a:xfrm>
           <a:prstGeom prst="rect">
             <a:avLst/>
@@ -3242,74 +3243,85 @@
           </a:bodyPr>
           <a:lstStyle/>
           <a:p>
-            <a:pPr marL="285750" indent="-285750">
-              <a:buFontTx/>
-              <a:buChar char="-"/>
+            <a:pPr marL="342900" indent="-342900">
+              <a:buFont typeface="Arial"/>
+              <a:buChar char="•"/>
             </a:pPr>
             <a:r>
-              <a:rPr lang="en-US" dirty="0" smtClean="0"/>
-              <a:t>Connection to Game Theory</a:t>
-            </a:r>
-          </a:p>
-          <a:p>
-            <a:pPr marL="285750" indent="-285750">
-              <a:buFontTx/>
-              <a:buChar char="-"/>
+              <a:rPr lang="en-US" sz="2400" dirty="0" smtClean="0"/>
+              <a:t>Area of machine learning inspired by behavioral psychology!</a:t>
+            </a:r>
+          </a:p>
+          <a:p>
+            <a:pPr marL="342900" indent="-342900">
+              <a:buFont typeface="Arial"/>
+              <a:buChar char="•"/>
             </a:pPr>
-            <a:r>
-              <a:rPr lang="en-US" dirty="0" smtClean="0"/>
-              <a:t>Markov Decision Process</a:t>
-            </a:r>
-          </a:p>
-          <a:p>
-            <a:pPr marL="742950" lvl="1" indent="-285750">
-              <a:buFontTx/>
-              <a:buChar char="-"/>
+            <a:endParaRPr lang="en-US" sz="2400" dirty="0" smtClean="0"/>
+          </a:p>
+          <a:p>
+            <a:pPr marL="342900" indent="-342900">
+              <a:buFont typeface="Arial"/>
+              <a:buChar char="•"/>
             </a:pPr>
             <a:r>
-              <a:rPr lang="en-US" dirty="0" smtClean="0"/>
-              <a:t>Terminology</a:t>
-            </a:r>
-          </a:p>
-          <a:p>
-            <a:pPr marL="742950" lvl="1" indent="-285750">
-              <a:buFontTx/>
-              <a:buChar char="-"/>
+              <a:rPr lang="en-US" sz="2400" dirty="0" smtClean="0"/>
+              <a:t>Humans learn by experience, and so can machines</a:t>
+            </a:r>
+          </a:p>
+          <a:p>
+            <a:pPr marL="800100" lvl="1" indent="-342900">
+              <a:buFont typeface="Arial"/>
+              <a:buChar char="•"/>
             </a:pPr>
             <a:r>
-              <a:rPr lang="en-US" dirty="0" smtClean="0"/>
-              <a:t>Rewards, policy, action</a:t>
-            </a:r>
-          </a:p>
-          <a:p>
-            <a:pPr marL="742950" lvl="1" indent="-285750">
-              <a:buFontTx/>
-              <a:buChar char="-"/>
+              <a:rPr lang="en-US" sz="2400" dirty="0"/>
+              <a:t>e</a:t>
+            </a:r>
+            <a:r>
+              <a:rPr lang="en-US" sz="2400" dirty="0" smtClean="0"/>
+              <a:t>xample of Hans the Horse</a:t>
+            </a:r>
+          </a:p>
+          <a:p>
+            <a:pPr lvl="1"/>
+            <a:endParaRPr lang="en-US" sz="2400" dirty="0" smtClean="0"/>
+          </a:p>
+          <a:p>
+            <a:pPr marL="342900" indent="-342900">
+              <a:buFont typeface="Arial"/>
+              <a:buChar char="•"/>
             </a:pPr>
             <a:r>
-              <a:rPr lang="en-US" dirty="0" smtClean="0"/>
-              <a:t>Value iteration, policy iteration</a:t>
-            </a:r>
-            <a:endParaRPr lang="en-US" dirty="0"/>
-          </a:p>
-          <a:p>
-            <a:pPr marL="285750" indent="-285750">
-              <a:buFontTx/>
-              <a:buChar char="-"/>
+              <a:rPr lang="en-US" sz="2400" dirty="0" smtClean="0"/>
+              <a:t>Concept of reward/loss - Human learning, and game theory are essentially the same</a:t>
+            </a:r>
+          </a:p>
+          <a:p>
+            <a:pPr marL="342900" indent="-342900">
+              <a:buFont typeface="Arial"/>
+              <a:buChar char="•"/>
             </a:pPr>
-            <a:r>
-              <a:rPr lang="en-US" dirty="0" smtClean="0"/>
-              <a:t>How to learn the initial rewards and probabilities? The aspect of learning/training</a:t>
-            </a:r>
-          </a:p>
-          <a:p>
-            <a:pPr marL="285750" indent="-285750">
-              <a:buFontTx/>
-              <a:buChar char="-"/>
+            <a:endParaRPr lang="en-US" sz="2400" dirty="0"/>
+          </a:p>
+          <a:p>
+            <a:pPr marL="342900" indent="-342900">
+              <a:buFont typeface="Arial"/>
+              <a:buChar char="•"/>
             </a:pPr>
             <a:r>
-              <a:rPr lang="en-US" dirty="0" smtClean="0"/>
-              <a:t>Single and Multi-agent reinforcement learning</a:t>
+              <a:rPr lang="en-US" sz="2400" dirty="0" smtClean="0"/>
+              <a:t>But, machines understand logic and math – not philosophical theories. </a:t>
+            </a:r>
+          </a:p>
+          <a:p>
+            <a:pPr marL="800100" lvl="1" indent="-342900">
+              <a:buFont typeface="Arial"/>
+              <a:buChar char="•"/>
+            </a:pPr>
+            <a:r>
+              <a:rPr lang="en-US" sz="2400" dirty="0" smtClean="0"/>
+              <a:t>Markov Decision Processes</a:t>
             </a:r>
           </a:p>
         </p:txBody>
@@ -3356,6 +3368,1350 @@
         </p:nvSpPr>
         <p:spPr/>
         <p:txBody>
+          <a:bodyPr/>
+          <a:lstStyle/>
+          <a:p>
+            <a:r>
+              <a:rPr lang="en-US" dirty="0" smtClean="0"/>
+              <a:t>4.1 Markov Decision Models</a:t>
+            </a:r>
+            <a:endParaRPr lang="en-US" dirty="0"/>
+          </a:p>
+        </p:txBody>
+      </p:sp>
+      <p:sp>
+        <p:nvSpPr>
+          <p:cNvPr id="4" name="TextBox 3"/>
+          <p:cNvSpPr txBox="1"/>
+          <p:nvPr/>
+        </p:nvSpPr>
+        <p:spPr>
+          <a:xfrm>
+            <a:off x="1072127" y="1798009"/>
+            <a:ext cx="7043044" cy="2308324"/>
+          </a:xfrm>
+          <a:prstGeom prst="rect">
+            <a:avLst/>
+          </a:prstGeom>
+          <a:noFill/>
+        </p:spPr>
+        <p:txBody>
+          <a:bodyPr wrap="square" rtlCol="0">
+            <a:spAutoFit/>
+          </a:bodyPr>
+          <a:lstStyle/>
+          <a:p>
+            <a:pPr marL="342900" indent="-342900">
+              <a:buFont typeface="Arial"/>
+              <a:buChar char="•"/>
+            </a:pPr>
+            <a:r>
+              <a:rPr lang="en-US" sz="2400" dirty="0" smtClean="0"/>
+              <a:t>Formulates the environment for applying ML </a:t>
+            </a:r>
+            <a:r>
+              <a:rPr lang="en-US" sz="2400" dirty="0" err="1" smtClean="0"/>
+              <a:t>algos</a:t>
+            </a:r>
+            <a:endParaRPr lang="en-US" sz="2400" dirty="0" smtClean="0"/>
+          </a:p>
+          <a:p>
+            <a:pPr marL="342900" indent="-342900">
+              <a:buFont typeface="Arial"/>
+              <a:buChar char="•"/>
+            </a:pPr>
+            <a:r>
+              <a:rPr lang="en-US" sz="2400" dirty="0" smtClean="0"/>
+              <a:t>Each game has different possible states (which can occur at any given time)</a:t>
+            </a:r>
+          </a:p>
+          <a:p>
+            <a:pPr marL="342900" indent="-342900">
+              <a:buFont typeface="Arial"/>
+              <a:buChar char="•"/>
+            </a:pPr>
+            <a:r>
+              <a:rPr lang="en-US" sz="2400" dirty="0" smtClean="0"/>
+              <a:t>For each state (s), we have a reward (R), a value (V), and a set of actions (a) – which take the </a:t>
+            </a:r>
+          </a:p>
+          <a:p>
+            <a:pPr marL="342900" indent="-342900">
+              <a:buFont typeface="Arial"/>
+              <a:buChar char="•"/>
+            </a:pPr>
+            <a:endParaRPr lang="en-US" sz="2400" dirty="0" smtClean="0"/>
+          </a:p>
+        </p:txBody>
+      </p:sp>
+      <p:graphicFrame>
+        <p:nvGraphicFramePr>
+          <p:cNvPr id="5" name="Table 4"/>
+          <p:cNvGraphicFramePr>
+            <a:graphicFrameLocks noGrp="1"/>
+          </p:cNvGraphicFramePr>
+          <p:nvPr>
+            <p:extLst>
+              <p:ext uri="{D42A27DB-BD31-4B8C-83A1-F6EECF244321}">
+                <p14:modId xmlns:p14="http://schemas.microsoft.com/office/powerpoint/2010/main" val="550564249"/>
+              </p:ext>
+            </p:extLst>
+          </p:nvPr>
+        </p:nvGraphicFramePr>
+        <p:xfrm>
+          <a:off x="1348692" y="4121973"/>
+          <a:ext cx="6442725" cy="2297988"/>
+        </p:xfrm>
+        <a:graphic>
+          <a:graphicData uri="http://schemas.openxmlformats.org/drawingml/2006/table">
+            <a:tbl>
+              <a:tblPr firstRow="1" bandRow="1">
+                <a:tableStyleId>{2D5ABB26-0587-4C30-8999-92F81FD0307C}</a:tableStyleId>
+              </a:tblPr>
+              <a:tblGrid>
+                <a:gridCol w="1288545"/>
+                <a:gridCol w="1288545"/>
+                <a:gridCol w="1288545"/>
+                <a:gridCol w="1288545"/>
+                <a:gridCol w="1288545"/>
+              </a:tblGrid>
+              <a:tr h="574497">
+                <a:tc>
+                  <a:txBody>
+                    <a:bodyPr/>
+                    <a:lstStyle/>
+                    <a:p>
+                      <a:pPr algn="ctr"/>
+                      <a:endParaRPr lang="en-US" dirty="0"/>
+                    </a:p>
+                  </a:txBody>
+                  <a:tcPr>
+                    <a:lnL w="12700" cap="flat" cmpd="sng" algn="ctr">
+                      <a:solidFill>
+                        <a:scrgbClr r="0" g="0" b="0"/>
+                      </a:solidFill>
+                      <a:prstDash val="solid"/>
+                      <a:round/>
+                      <a:headEnd type="none" w="med" len="med"/>
+                      <a:tailEnd type="none" w="med" len="med"/>
+                    </a:lnL>
+                    <a:lnR w="28575" cap="flat" cmpd="sng" algn="ctr">
+                      <a:solidFill>
+                        <a:scrgbClr r="0" g="0" b="0"/>
+                      </a:solidFill>
+                      <a:prstDash val="solid"/>
+                      <a:round/>
+                      <a:headEnd type="none" w="med" len="med"/>
+                      <a:tailEnd type="none" w="med" len="med"/>
+                    </a:lnR>
+                    <a:lnT w="12700" cap="flat" cmpd="sng" algn="ctr">
+                      <a:solidFill>
+                        <a:scrgbClr r="0" g="0" b="0"/>
+                      </a:solidFill>
+                      <a:prstDash val="solid"/>
+                      <a:round/>
+                      <a:headEnd type="none" w="med" len="med"/>
+                      <a:tailEnd type="none" w="med" len="med"/>
+                    </a:lnT>
+                    <a:lnB w="28575" cap="flat" cmpd="sng" algn="ctr">
+                      <a:solidFill>
+                        <a:scrgbClr r="0" g="0" b="0"/>
+                      </a:solidFill>
+                      <a:prstDash val="solid"/>
+                      <a:round/>
+                      <a:headEnd type="none" w="med" len="med"/>
+                      <a:tailEnd type="none" w="med" len="med"/>
+                    </a:lnB>
+                  </a:tcPr>
+                </a:tc>
+                <a:tc>
+                  <a:txBody>
+                    <a:bodyPr/>
+                    <a:lstStyle/>
+                    <a:p>
+                      <a:pPr algn="ctr"/>
+                      <a:r>
+                        <a:rPr lang="en-US" dirty="0" smtClean="0"/>
+                        <a:t>(1)</a:t>
+                      </a:r>
+                      <a:endParaRPr lang="en-US" dirty="0"/>
+                    </a:p>
+                  </a:txBody>
+                  <a:tcPr>
+                    <a:lnL w="28575" cap="flat" cmpd="sng" algn="ctr">
+                      <a:solidFill>
+                        <a:scrgbClr r="0" g="0" b="0"/>
+                      </a:solidFill>
+                      <a:prstDash val="solid"/>
+                      <a:round/>
+                      <a:headEnd type="none" w="med" len="med"/>
+                      <a:tailEnd type="none" w="med" len="med"/>
+                    </a:lnL>
+                    <a:lnR w="12700" cap="flat" cmpd="sng" algn="ctr">
+                      <a:solidFill>
+                        <a:scrgbClr r="0" g="0" b="0"/>
+                      </a:solidFill>
+                      <a:prstDash val="solid"/>
+                      <a:round/>
+                      <a:headEnd type="none" w="med" len="med"/>
+                      <a:tailEnd type="none" w="med" len="med"/>
+                    </a:lnR>
+                    <a:lnT w="12700" cap="flat" cmpd="sng" algn="ctr">
+                      <a:solidFill>
+                        <a:scrgbClr r="0" g="0" b="0"/>
+                      </a:solidFill>
+                      <a:prstDash val="solid"/>
+                      <a:round/>
+                      <a:headEnd type="none" w="med" len="med"/>
+                      <a:tailEnd type="none" w="med" len="med"/>
+                    </a:lnT>
+                    <a:lnB w="28575" cap="flat" cmpd="sng" algn="ctr">
+                      <a:solidFill>
+                        <a:scrgbClr r="0" g="0" b="0"/>
+                      </a:solidFill>
+                      <a:prstDash val="solid"/>
+                      <a:round/>
+                      <a:headEnd type="none" w="med" len="med"/>
+                      <a:tailEnd type="none" w="med" len="med"/>
+                    </a:lnB>
+                  </a:tcPr>
+                </a:tc>
+                <a:tc>
+                  <a:txBody>
+                    <a:bodyPr/>
+                    <a:lstStyle/>
+                    <a:p>
+                      <a:pPr algn="ctr"/>
+                      <a:r>
+                        <a:rPr lang="en-US" dirty="0" smtClean="0"/>
+                        <a:t>(2)</a:t>
+                      </a:r>
+                      <a:endParaRPr lang="en-US" dirty="0"/>
+                    </a:p>
+                  </a:txBody>
+                  <a:tcPr>
+                    <a:lnL w="12700" cap="flat" cmpd="sng" algn="ctr">
+                      <a:solidFill>
+                        <a:scrgbClr r="0" g="0" b="0"/>
+                      </a:solidFill>
+                      <a:prstDash val="solid"/>
+                      <a:round/>
+                      <a:headEnd type="none" w="med" len="med"/>
+                      <a:tailEnd type="none" w="med" len="med"/>
+                    </a:lnL>
+                    <a:lnR w="12700" cap="flat" cmpd="sng" algn="ctr">
+                      <a:solidFill>
+                        <a:scrgbClr r="0" g="0" b="0"/>
+                      </a:solidFill>
+                      <a:prstDash val="solid"/>
+                      <a:round/>
+                      <a:headEnd type="none" w="med" len="med"/>
+                      <a:tailEnd type="none" w="med" len="med"/>
+                    </a:lnR>
+                    <a:lnT w="12700" cap="flat" cmpd="sng" algn="ctr">
+                      <a:solidFill>
+                        <a:scrgbClr r="0" g="0" b="0"/>
+                      </a:solidFill>
+                      <a:prstDash val="solid"/>
+                      <a:round/>
+                      <a:headEnd type="none" w="med" len="med"/>
+                      <a:tailEnd type="none" w="med" len="med"/>
+                    </a:lnT>
+                    <a:lnB w="28575" cap="flat" cmpd="sng" algn="ctr">
+                      <a:solidFill>
+                        <a:scrgbClr r="0" g="0" b="0"/>
+                      </a:solidFill>
+                      <a:prstDash val="solid"/>
+                      <a:round/>
+                      <a:headEnd type="none" w="med" len="med"/>
+                      <a:tailEnd type="none" w="med" len="med"/>
+                    </a:lnB>
+                  </a:tcPr>
+                </a:tc>
+                <a:tc>
+                  <a:txBody>
+                    <a:bodyPr/>
+                    <a:lstStyle/>
+                    <a:p>
+                      <a:pPr algn="ctr"/>
+                      <a:r>
+                        <a:rPr lang="en-US" dirty="0" smtClean="0"/>
+                        <a:t>(3)</a:t>
+                      </a:r>
+                      <a:endParaRPr lang="en-US" dirty="0"/>
+                    </a:p>
+                  </a:txBody>
+                  <a:tcPr>
+                    <a:lnL w="12700" cap="flat" cmpd="sng" algn="ctr">
+                      <a:solidFill>
+                        <a:scrgbClr r="0" g="0" b="0"/>
+                      </a:solidFill>
+                      <a:prstDash val="solid"/>
+                      <a:round/>
+                      <a:headEnd type="none" w="med" len="med"/>
+                      <a:tailEnd type="none" w="med" len="med"/>
+                    </a:lnL>
+                    <a:lnR w="12700" cap="flat" cmpd="sng" algn="ctr">
+                      <a:solidFill>
+                        <a:scrgbClr r="0" g="0" b="0"/>
+                      </a:solidFill>
+                      <a:prstDash val="solid"/>
+                      <a:round/>
+                      <a:headEnd type="none" w="med" len="med"/>
+                      <a:tailEnd type="none" w="med" len="med"/>
+                    </a:lnR>
+                    <a:lnT w="12700" cap="flat" cmpd="sng" algn="ctr">
+                      <a:solidFill>
+                        <a:scrgbClr r="0" g="0" b="0"/>
+                      </a:solidFill>
+                      <a:prstDash val="solid"/>
+                      <a:round/>
+                      <a:headEnd type="none" w="med" len="med"/>
+                      <a:tailEnd type="none" w="med" len="med"/>
+                    </a:lnT>
+                    <a:lnB w="28575" cap="flat" cmpd="sng" algn="ctr">
+                      <a:solidFill>
+                        <a:scrgbClr r="0" g="0" b="0"/>
+                      </a:solidFill>
+                      <a:prstDash val="solid"/>
+                      <a:round/>
+                      <a:headEnd type="none" w="med" len="med"/>
+                      <a:tailEnd type="none" w="med" len="med"/>
+                    </a:lnB>
+                  </a:tcPr>
+                </a:tc>
+                <a:tc>
+                  <a:txBody>
+                    <a:bodyPr/>
+                    <a:lstStyle/>
+                    <a:p>
+                      <a:pPr algn="ctr"/>
+                      <a:r>
+                        <a:rPr lang="en-US" dirty="0" smtClean="0"/>
+                        <a:t>(4)</a:t>
+                      </a:r>
+                      <a:endParaRPr lang="en-US" dirty="0"/>
+                    </a:p>
+                  </a:txBody>
+                  <a:tcPr>
+                    <a:lnL w="12700" cap="flat" cmpd="sng" algn="ctr">
+                      <a:solidFill>
+                        <a:scrgbClr r="0" g="0" b="0"/>
+                      </a:solidFill>
+                      <a:prstDash val="solid"/>
+                      <a:round/>
+                      <a:headEnd type="none" w="med" len="med"/>
+                      <a:tailEnd type="none" w="med" len="med"/>
+                    </a:lnL>
+                    <a:lnR w="12700" cap="flat" cmpd="sng" algn="ctr">
+                      <a:solidFill>
+                        <a:scrgbClr r="0" g="0" b="0"/>
+                      </a:solidFill>
+                      <a:prstDash val="solid"/>
+                      <a:round/>
+                      <a:headEnd type="none" w="med" len="med"/>
+                      <a:tailEnd type="none" w="med" len="med"/>
+                    </a:lnR>
+                    <a:lnT w="12700" cap="flat" cmpd="sng" algn="ctr">
+                      <a:solidFill>
+                        <a:scrgbClr r="0" g="0" b="0"/>
+                      </a:solidFill>
+                      <a:prstDash val="solid"/>
+                      <a:round/>
+                      <a:headEnd type="none" w="med" len="med"/>
+                      <a:tailEnd type="none" w="med" len="med"/>
+                    </a:lnT>
+                    <a:lnB w="28575" cap="flat" cmpd="sng" algn="ctr">
+                      <a:solidFill>
+                        <a:scrgbClr r="0" g="0" b="0"/>
+                      </a:solidFill>
+                      <a:prstDash val="solid"/>
+                      <a:round/>
+                      <a:headEnd type="none" w="med" len="med"/>
+                      <a:tailEnd type="none" w="med" len="med"/>
+                    </a:lnB>
+                  </a:tcPr>
+                </a:tc>
+              </a:tr>
+              <a:tr h="574497">
+                <a:tc>
+                  <a:txBody>
+                    <a:bodyPr/>
+                    <a:lstStyle/>
+                    <a:p>
+                      <a:pPr algn="ctr"/>
+                      <a:r>
+                        <a:rPr lang="en-US" dirty="0" smtClean="0"/>
+                        <a:t>(1)</a:t>
+                      </a:r>
+                      <a:endParaRPr lang="en-US" dirty="0"/>
+                    </a:p>
+                  </a:txBody>
+                  <a:tcPr>
+                    <a:lnL w="12700" cap="flat" cmpd="sng" algn="ctr">
+                      <a:solidFill>
+                        <a:scrgbClr r="0" g="0" b="0"/>
+                      </a:solidFill>
+                      <a:prstDash val="solid"/>
+                      <a:round/>
+                      <a:headEnd type="none" w="med" len="med"/>
+                      <a:tailEnd type="none" w="med" len="med"/>
+                    </a:lnL>
+                    <a:lnR w="28575" cap="flat" cmpd="sng" algn="ctr">
+                      <a:solidFill>
+                        <a:scrgbClr r="0" g="0" b="0"/>
+                      </a:solidFill>
+                      <a:prstDash val="solid"/>
+                      <a:round/>
+                      <a:headEnd type="none" w="med" len="med"/>
+                      <a:tailEnd type="none" w="med" len="med"/>
+                    </a:lnR>
+                    <a:lnT w="28575" cap="flat" cmpd="sng" algn="ctr">
+                      <a:solidFill>
+                        <a:scrgbClr r="0" g="0" b="0"/>
+                      </a:solidFill>
+                      <a:prstDash val="solid"/>
+                      <a:round/>
+                      <a:headEnd type="none" w="med" len="med"/>
+                      <a:tailEnd type="none" w="med" len="med"/>
+                    </a:lnT>
+                    <a:lnB w="12700" cap="flat" cmpd="sng" algn="ctr">
+                      <a:solidFill>
+                        <a:scrgbClr r="0" g="0" b="0"/>
+                      </a:solidFill>
+                      <a:prstDash val="solid"/>
+                      <a:round/>
+                      <a:headEnd type="none" w="med" len="med"/>
+                      <a:tailEnd type="none" w="med" len="med"/>
+                    </a:lnB>
+                  </a:tcPr>
+                </a:tc>
+                <a:tc>
+                  <a:txBody>
+                    <a:bodyPr/>
+                    <a:lstStyle/>
+                    <a:p>
+                      <a:pPr algn="ctr"/>
+                      <a:endParaRPr lang="en-US" dirty="0"/>
+                    </a:p>
+                  </a:txBody>
+                  <a:tcPr>
+                    <a:lnL w="28575" cap="flat" cmpd="sng" algn="ctr">
+                      <a:solidFill>
+                        <a:scrgbClr r="0" g="0" b="0"/>
+                      </a:solidFill>
+                      <a:prstDash val="solid"/>
+                      <a:round/>
+                      <a:headEnd type="none" w="med" len="med"/>
+                      <a:tailEnd type="none" w="med" len="med"/>
+                    </a:lnL>
+                    <a:lnR w="12700" cap="flat" cmpd="sng" algn="ctr">
+                      <a:solidFill>
+                        <a:scrgbClr r="0" g="0" b="0"/>
+                      </a:solidFill>
+                      <a:prstDash val="solid"/>
+                      <a:round/>
+                      <a:headEnd type="none" w="med" len="med"/>
+                      <a:tailEnd type="none" w="med" len="med"/>
+                    </a:lnR>
+                    <a:lnT w="28575" cap="flat" cmpd="sng" algn="ctr">
+                      <a:solidFill>
+                        <a:scrgbClr r="0" g="0" b="0"/>
+                      </a:solidFill>
+                      <a:prstDash val="solid"/>
+                      <a:round/>
+                      <a:headEnd type="none" w="med" len="med"/>
+                      <a:tailEnd type="none" w="med" len="med"/>
+                    </a:lnT>
+                    <a:lnB w="12700" cap="flat" cmpd="sng" algn="ctr">
+                      <a:solidFill>
+                        <a:scrgbClr r="0" g="0" b="0"/>
+                      </a:solidFill>
+                      <a:prstDash val="solid"/>
+                      <a:round/>
+                      <a:headEnd type="none" w="med" len="med"/>
+                      <a:tailEnd type="none" w="med" len="med"/>
+                    </a:lnB>
+                    <a:solidFill>
+                      <a:srgbClr val="FFFF00"/>
+                    </a:solidFill>
+                  </a:tcPr>
+                </a:tc>
+                <a:tc>
+                  <a:txBody>
+                    <a:bodyPr/>
+                    <a:lstStyle/>
+                    <a:p>
+                      <a:pPr algn="ctr"/>
+                      <a:endParaRPr lang="en-US" dirty="0"/>
+                    </a:p>
+                  </a:txBody>
+                  <a:tcPr>
+                    <a:lnL w="12700" cap="flat" cmpd="sng" algn="ctr">
+                      <a:solidFill>
+                        <a:scrgbClr r="0" g="0" b="0"/>
+                      </a:solidFill>
+                      <a:prstDash val="solid"/>
+                      <a:round/>
+                      <a:headEnd type="none" w="med" len="med"/>
+                      <a:tailEnd type="none" w="med" len="med"/>
+                    </a:lnL>
+                    <a:lnR w="12700" cap="flat" cmpd="sng" algn="ctr">
+                      <a:solidFill>
+                        <a:scrgbClr r="0" g="0" b="0"/>
+                      </a:solidFill>
+                      <a:prstDash val="solid"/>
+                      <a:round/>
+                      <a:headEnd type="none" w="med" len="med"/>
+                      <a:tailEnd type="none" w="med" len="med"/>
+                    </a:lnR>
+                    <a:lnT w="28575" cap="flat" cmpd="sng" algn="ctr">
+                      <a:solidFill>
+                        <a:scrgbClr r="0" g="0" b="0"/>
+                      </a:solidFill>
+                      <a:prstDash val="solid"/>
+                      <a:round/>
+                      <a:headEnd type="none" w="med" len="med"/>
+                      <a:tailEnd type="none" w="med" len="med"/>
+                    </a:lnT>
+                    <a:lnB w="12700" cap="flat" cmpd="sng" algn="ctr">
+                      <a:solidFill>
+                        <a:scrgbClr r="0" g="0" b="0"/>
+                      </a:solidFill>
+                      <a:prstDash val="solid"/>
+                      <a:round/>
+                      <a:headEnd type="none" w="med" len="med"/>
+                      <a:tailEnd type="none" w="med" len="med"/>
+                    </a:lnB>
+                    <a:solidFill>
+                      <a:srgbClr val="FFFF00"/>
+                    </a:solidFill>
+                  </a:tcPr>
+                </a:tc>
+                <a:tc>
+                  <a:txBody>
+                    <a:bodyPr/>
+                    <a:lstStyle/>
+                    <a:p>
+                      <a:pPr algn="ctr"/>
+                      <a:endParaRPr lang="en-US" dirty="0"/>
+                    </a:p>
+                  </a:txBody>
+                  <a:tcPr>
+                    <a:lnL w="12700" cap="flat" cmpd="sng" algn="ctr">
+                      <a:solidFill>
+                        <a:scrgbClr r="0" g="0" b="0"/>
+                      </a:solidFill>
+                      <a:prstDash val="solid"/>
+                      <a:round/>
+                      <a:headEnd type="none" w="med" len="med"/>
+                      <a:tailEnd type="none" w="med" len="med"/>
+                    </a:lnL>
+                    <a:lnR w="12700" cap="flat" cmpd="sng" algn="ctr">
+                      <a:solidFill>
+                        <a:scrgbClr r="0" g="0" b="0"/>
+                      </a:solidFill>
+                      <a:prstDash val="solid"/>
+                      <a:round/>
+                      <a:headEnd type="none" w="med" len="med"/>
+                      <a:tailEnd type="none" w="med" len="med"/>
+                    </a:lnR>
+                    <a:lnT w="28575" cap="flat" cmpd="sng" algn="ctr">
+                      <a:solidFill>
+                        <a:scrgbClr r="0" g="0" b="0"/>
+                      </a:solidFill>
+                      <a:prstDash val="solid"/>
+                      <a:round/>
+                      <a:headEnd type="none" w="med" len="med"/>
+                      <a:tailEnd type="none" w="med" len="med"/>
+                    </a:lnT>
+                    <a:lnB w="12700" cap="flat" cmpd="sng" algn="ctr">
+                      <a:solidFill>
+                        <a:scrgbClr r="0" g="0" b="0"/>
+                      </a:solidFill>
+                      <a:prstDash val="solid"/>
+                      <a:round/>
+                      <a:headEnd type="none" w="med" len="med"/>
+                      <a:tailEnd type="none" w="med" len="med"/>
+                    </a:lnB>
+                    <a:solidFill>
+                      <a:srgbClr val="FFFF00"/>
+                    </a:solidFill>
+                  </a:tcPr>
+                </a:tc>
+                <a:tc>
+                  <a:txBody>
+                    <a:bodyPr/>
+                    <a:lstStyle/>
+                    <a:p>
+                      <a:pPr algn="ctr"/>
+                      <a:endParaRPr lang="en-US" dirty="0"/>
+                    </a:p>
+                  </a:txBody>
+                  <a:tcPr>
+                    <a:lnL w="12700" cap="flat" cmpd="sng" algn="ctr">
+                      <a:solidFill>
+                        <a:scrgbClr r="0" g="0" b="0"/>
+                      </a:solidFill>
+                      <a:prstDash val="solid"/>
+                      <a:round/>
+                      <a:headEnd type="none" w="med" len="med"/>
+                      <a:tailEnd type="none" w="med" len="med"/>
+                    </a:lnL>
+                    <a:lnR w="12700" cap="flat" cmpd="sng" algn="ctr">
+                      <a:solidFill>
+                        <a:scrgbClr r="0" g="0" b="0"/>
+                      </a:solidFill>
+                      <a:prstDash val="solid"/>
+                      <a:round/>
+                      <a:headEnd type="none" w="med" len="med"/>
+                      <a:tailEnd type="none" w="med" len="med"/>
+                    </a:lnR>
+                    <a:lnT w="28575" cap="flat" cmpd="sng" algn="ctr">
+                      <a:solidFill>
+                        <a:scrgbClr r="0" g="0" b="0"/>
+                      </a:solidFill>
+                      <a:prstDash val="solid"/>
+                      <a:round/>
+                      <a:headEnd type="none" w="med" len="med"/>
+                      <a:tailEnd type="none" w="med" len="med"/>
+                    </a:lnT>
+                    <a:lnB w="12700" cap="flat" cmpd="sng" algn="ctr">
+                      <a:solidFill>
+                        <a:scrgbClr r="0" g="0" b="0"/>
+                      </a:solidFill>
+                      <a:prstDash val="solid"/>
+                      <a:round/>
+                      <a:headEnd type="none" w="med" len="med"/>
+                      <a:tailEnd type="none" w="med" len="med"/>
+                    </a:lnB>
+                    <a:solidFill>
+                      <a:srgbClr val="008000"/>
+                    </a:solidFill>
+                  </a:tcPr>
+                </a:tc>
+              </a:tr>
+              <a:tr h="574497">
+                <a:tc>
+                  <a:txBody>
+                    <a:bodyPr/>
+                    <a:lstStyle/>
+                    <a:p>
+                      <a:pPr algn="ctr"/>
+                      <a:r>
+                        <a:rPr lang="en-US" dirty="0" smtClean="0"/>
+                        <a:t>(2)</a:t>
+                      </a:r>
+                      <a:endParaRPr lang="en-US" dirty="0"/>
+                    </a:p>
+                  </a:txBody>
+                  <a:tcPr>
+                    <a:lnL w="12700" cap="flat" cmpd="sng" algn="ctr">
+                      <a:solidFill>
+                        <a:scrgbClr r="0" g="0" b="0"/>
+                      </a:solidFill>
+                      <a:prstDash val="solid"/>
+                      <a:round/>
+                      <a:headEnd type="none" w="med" len="med"/>
+                      <a:tailEnd type="none" w="med" len="med"/>
+                    </a:lnL>
+                    <a:lnR w="28575" cap="flat" cmpd="sng" algn="ctr">
+                      <a:solidFill>
+                        <a:scrgbClr r="0" g="0" b="0"/>
+                      </a:solidFill>
+                      <a:prstDash val="solid"/>
+                      <a:round/>
+                      <a:headEnd type="none" w="med" len="med"/>
+                      <a:tailEnd type="none" w="med" len="med"/>
+                    </a:lnR>
+                    <a:lnT w="12700" cap="flat" cmpd="sng" algn="ctr">
+                      <a:solidFill>
+                        <a:scrgbClr r="0" g="0" b="0"/>
+                      </a:solidFill>
+                      <a:prstDash val="solid"/>
+                      <a:round/>
+                      <a:headEnd type="none" w="med" len="med"/>
+                      <a:tailEnd type="none" w="med" len="med"/>
+                    </a:lnT>
+                    <a:lnB w="12700" cap="flat" cmpd="sng" algn="ctr">
+                      <a:solidFill>
+                        <a:scrgbClr r="0" g="0" b="0"/>
+                      </a:solidFill>
+                      <a:prstDash val="solid"/>
+                      <a:round/>
+                      <a:headEnd type="none" w="med" len="med"/>
+                      <a:tailEnd type="none" w="med" len="med"/>
+                    </a:lnB>
+                  </a:tcPr>
+                </a:tc>
+                <a:tc>
+                  <a:txBody>
+                    <a:bodyPr/>
+                    <a:lstStyle/>
+                    <a:p>
+                      <a:pPr algn="ctr"/>
+                      <a:endParaRPr lang="en-US" dirty="0"/>
+                    </a:p>
+                  </a:txBody>
+                  <a:tcPr>
+                    <a:lnL w="28575" cap="flat" cmpd="sng" algn="ctr">
+                      <a:solidFill>
+                        <a:scrgbClr r="0" g="0" b="0"/>
+                      </a:solidFill>
+                      <a:prstDash val="solid"/>
+                      <a:round/>
+                      <a:headEnd type="none" w="med" len="med"/>
+                      <a:tailEnd type="none" w="med" len="med"/>
+                    </a:lnL>
+                    <a:lnR w="12700" cap="flat" cmpd="sng" algn="ctr">
+                      <a:solidFill>
+                        <a:scrgbClr r="0" g="0" b="0"/>
+                      </a:solidFill>
+                      <a:prstDash val="solid"/>
+                      <a:round/>
+                      <a:headEnd type="none" w="med" len="med"/>
+                      <a:tailEnd type="none" w="med" len="med"/>
+                    </a:lnR>
+                    <a:lnT w="12700" cap="flat" cmpd="sng" algn="ctr">
+                      <a:solidFill>
+                        <a:scrgbClr r="0" g="0" b="0"/>
+                      </a:solidFill>
+                      <a:prstDash val="solid"/>
+                      <a:round/>
+                      <a:headEnd type="none" w="med" len="med"/>
+                      <a:tailEnd type="none" w="med" len="med"/>
+                    </a:lnT>
+                    <a:lnB w="12700" cap="flat" cmpd="sng" algn="ctr">
+                      <a:solidFill>
+                        <a:scrgbClr r="0" g="0" b="0"/>
+                      </a:solidFill>
+                      <a:prstDash val="solid"/>
+                      <a:round/>
+                      <a:headEnd type="none" w="med" len="med"/>
+                      <a:tailEnd type="none" w="med" len="med"/>
+                    </a:lnB>
+                    <a:solidFill>
+                      <a:srgbClr val="FFFF00"/>
+                    </a:solidFill>
+                  </a:tcPr>
+                </a:tc>
+                <a:tc>
+                  <a:txBody>
+                    <a:bodyPr/>
+                    <a:lstStyle/>
+                    <a:p>
+                      <a:pPr algn="ctr"/>
+                      <a:endParaRPr lang="en-US" dirty="0"/>
+                    </a:p>
+                  </a:txBody>
+                  <a:tcPr>
+                    <a:lnL w="12700" cap="flat" cmpd="sng" algn="ctr">
+                      <a:solidFill>
+                        <a:scrgbClr r="0" g="0" b="0"/>
+                      </a:solidFill>
+                      <a:prstDash val="solid"/>
+                      <a:round/>
+                      <a:headEnd type="none" w="med" len="med"/>
+                      <a:tailEnd type="none" w="med" len="med"/>
+                    </a:lnL>
+                    <a:lnR w="12700" cap="flat" cmpd="sng" algn="ctr">
+                      <a:solidFill>
+                        <a:scrgbClr r="0" g="0" b="0"/>
+                      </a:solidFill>
+                      <a:prstDash val="solid"/>
+                      <a:round/>
+                      <a:headEnd type="none" w="med" len="med"/>
+                      <a:tailEnd type="none" w="med" len="med"/>
+                    </a:lnR>
+                    <a:lnT w="12700" cap="flat" cmpd="sng" algn="ctr">
+                      <a:solidFill>
+                        <a:scrgbClr r="0" g="0" b="0"/>
+                      </a:solidFill>
+                      <a:prstDash val="solid"/>
+                      <a:round/>
+                      <a:headEnd type="none" w="med" len="med"/>
+                      <a:tailEnd type="none" w="med" len="med"/>
+                    </a:lnT>
+                    <a:lnB w="12700" cap="flat" cmpd="sng" algn="ctr">
+                      <a:solidFill>
+                        <a:scrgbClr r="0" g="0" b="0"/>
+                      </a:solidFill>
+                      <a:prstDash val="solid"/>
+                      <a:round/>
+                      <a:headEnd type="none" w="med" len="med"/>
+                      <a:tailEnd type="none" w="med" len="med"/>
+                    </a:lnB>
+                    <a:solidFill>
+                      <a:srgbClr val="FFFF00"/>
+                    </a:solidFill>
+                  </a:tcPr>
+                </a:tc>
+                <a:tc>
+                  <a:txBody>
+                    <a:bodyPr/>
+                    <a:lstStyle/>
+                    <a:p>
+                      <a:pPr algn="ctr"/>
+                      <a:endParaRPr lang="en-US" dirty="0"/>
+                    </a:p>
+                  </a:txBody>
+                  <a:tcPr>
+                    <a:lnL w="12700" cap="flat" cmpd="sng" algn="ctr">
+                      <a:solidFill>
+                        <a:scrgbClr r="0" g="0" b="0"/>
+                      </a:solidFill>
+                      <a:prstDash val="solid"/>
+                      <a:round/>
+                      <a:headEnd type="none" w="med" len="med"/>
+                      <a:tailEnd type="none" w="med" len="med"/>
+                    </a:lnL>
+                    <a:lnR w="12700" cap="flat" cmpd="sng" algn="ctr">
+                      <a:solidFill>
+                        <a:scrgbClr r="0" g="0" b="0"/>
+                      </a:solidFill>
+                      <a:prstDash val="solid"/>
+                      <a:round/>
+                      <a:headEnd type="none" w="med" len="med"/>
+                      <a:tailEnd type="none" w="med" len="med"/>
+                    </a:lnR>
+                    <a:lnT w="12700" cap="flat" cmpd="sng" algn="ctr">
+                      <a:solidFill>
+                        <a:scrgbClr r="0" g="0" b="0"/>
+                      </a:solidFill>
+                      <a:prstDash val="solid"/>
+                      <a:round/>
+                      <a:headEnd type="none" w="med" len="med"/>
+                      <a:tailEnd type="none" w="med" len="med"/>
+                    </a:lnT>
+                    <a:lnB w="12700" cap="flat" cmpd="sng" algn="ctr">
+                      <a:solidFill>
+                        <a:scrgbClr r="0" g="0" b="0"/>
+                      </a:solidFill>
+                      <a:prstDash val="solid"/>
+                      <a:round/>
+                      <a:headEnd type="none" w="med" len="med"/>
+                      <a:tailEnd type="none" w="med" len="med"/>
+                    </a:lnB>
+                    <a:solidFill>
+                      <a:srgbClr val="FF0000"/>
+                    </a:solidFill>
+                  </a:tcPr>
+                </a:tc>
+                <a:tc>
+                  <a:txBody>
+                    <a:bodyPr/>
+                    <a:lstStyle/>
+                    <a:p>
+                      <a:pPr algn="ctr"/>
+                      <a:endParaRPr lang="en-US" dirty="0"/>
+                    </a:p>
+                  </a:txBody>
+                  <a:tcPr>
+                    <a:lnL w="12700" cap="flat" cmpd="sng" algn="ctr">
+                      <a:solidFill>
+                        <a:scrgbClr r="0" g="0" b="0"/>
+                      </a:solidFill>
+                      <a:prstDash val="solid"/>
+                      <a:round/>
+                      <a:headEnd type="none" w="med" len="med"/>
+                      <a:tailEnd type="none" w="med" len="med"/>
+                    </a:lnL>
+                    <a:lnR w="12700" cap="flat" cmpd="sng" algn="ctr">
+                      <a:solidFill>
+                        <a:scrgbClr r="0" g="0" b="0"/>
+                      </a:solidFill>
+                      <a:prstDash val="solid"/>
+                      <a:round/>
+                      <a:headEnd type="none" w="med" len="med"/>
+                      <a:tailEnd type="none" w="med" len="med"/>
+                    </a:lnR>
+                    <a:lnT w="12700" cap="flat" cmpd="sng" algn="ctr">
+                      <a:solidFill>
+                        <a:scrgbClr r="0" g="0" b="0"/>
+                      </a:solidFill>
+                      <a:prstDash val="solid"/>
+                      <a:round/>
+                      <a:headEnd type="none" w="med" len="med"/>
+                      <a:tailEnd type="none" w="med" len="med"/>
+                    </a:lnT>
+                    <a:lnB w="12700" cap="flat" cmpd="sng" algn="ctr">
+                      <a:solidFill>
+                        <a:scrgbClr r="0" g="0" b="0"/>
+                      </a:solidFill>
+                      <a:prstDash val="solid"/>
+                      <a:round/>
+                      <a:headEnd type="none" w="med" len="med"/>
+                      <a:tailEnd type="none" w="med" len="med"/>
+                    </a:lnB>
+                    <a:solidFill>
+                      <a:srgbClr val="FFFF00"/>
+                    </a:solidFill>
+                  </a:tcPr>
+                </a:tc>
+              </a:tr>
+              <a:tr h="574497">
+                <a:tc>
+                  <a:txBody>
+                    <a:bodyPr/>
+                    <a:lstStyle/>
+                    <a:p>
+                      <a:pPr algn="ctr"/>
+                      <a:r>
+                        <a:rPr lang="en-US" dirty="0" smtClean="0"/>
+                        <a:t>(3)</a:t>
+                      </a:r>
+                      <a:endParaRPr lang="en-US" dirty="0"/>
+                    </a:p>
+                  </a:txBody>
+                  <a:tcPr>
+                    <a:lnL w="12700" cap="flat" cmpd="sng" algn="ctr">
+                      <a:solidFill>
+                        <a:scrgbClr r="0" g="0" b="0"/>
+                      </a:solidFill>
+                      <a:prstDash val="solid"/>
+                      <a:round/>
+                      <a:headEnd type="none" w="med" len="med"/>
+                      <a:tailEnd type="none" w="med" len="med"/>
+                    </a:lnL>
+                    <a:lnR w="28575" cap="flat" cmpd="sng" algn="ctr">
+                      <a:solidFill>
+                        <a:scrgbClr r="0" g="0" b="0"/>
+                      </a:solidFill>
+                      <a:prstDash val="solid"/>
+                      <a:round/>
+                      <a:headEnd type="none" w="med" len="med"/>
+                      <a:tailEnd type="none" w="med" len="med"/>
+                    </a:lnR>
+                    <a:lnT w="12700" cap="flat" cmpd="sng" algn="ctr">
+                      <a:solidFill>
+                        <a:scrgbClr r="0" g="0" b="0"/>
+                      </a:solidFill>
+                      <a:prstDash val="solid"/>
+                      <a:round/>
+                      <a:headEnd type="none" w="med" len="med"/>
+                      <a:tailEnd type="none" w="med" len="med"/>
+                    </a:lnT>
+                    <a:lnB w="12700" cap="flat" cmpd="sng" algn="ctr">
+                      <a:solidFill>
+                        <a:scrgbClr r="0" g="0" b="0"/>
+                      </a:solidFill>
+                      <a:prstDash val="solid"/>
+                      <a:round/>
+                      <a:headEnd type="none" w="med" len="med"/>
+                      <a:tailEnd type="none" w="med" len="med"/>
+                    </a:lnB>
+                  </a:tcPr>
+                </a:tc>
+                <a:tc>
+                  <a:txBody>
+                    <a:bodyPr/>
+                    <a:lstStyle/>
+                    <a:p>
+                      <a:pPr algn="ctr"/>
+                      <a:endParaRPr lang="en-US" dirty="0"/>
+                    </a:p>
+                  </a:txBody>
+                  <a:tcPr>
+                    <a:lnL w="28575" cap="flat" cmpd="sng" algn="ctr">
+                      <a:solidFill>
+                        <a:scrgbClr r="0" g="0" b="0"/>
+                      </a:solidFill>
+                      <a:prstDash val="solid"/>
+                      <a:round/>
+                      <a:headEnd type="none" w="med" len="med"/>
+                      <a:tailEnd type="none" w="med" len="med"/>
+                    </a:lnL>
+                    <a:lnR w="12700" cap="flat" cmpd="sng" algn="ctr">
+                      <a:solidFill>
+                        <a:scrgbClr r="0" g="0" b="0"/>
+                      </a:solidFill>
+                      <a:prstDash val="solid"/>
+                      <a:round/>
+                      <a:headEnd type="none" w="med" len="med"/>
+                      <a:tailEnd type="none" w="med" len="med"/>
+                    </a:lnR>
+                    <a:lnT w="12700" cap="flat" cmpd="sng" algn="ctr">
+                      <a:solidFill>
+                        <a:scrgbClr r="0" g="0" b="0"/>
+                      </a:solidFill>
+                      <a:prstDash val="solid"/>
+                      <a:round/>
+                      <a:headEnd type="none" w="med" len="med"/>
+                      <a:tailEnd type="none" w="med" len="med"/>
+                    </a:lnT>
+                    <a:lnB w="12700" cap="flat" cmpd="sng" algn="ctr">
+                      <a:solidFill>
+                        <a:scrgbClr r="0" g="0" b="0"/>
+                      </a:solidFill>
+                      <a:prstDash val="solid"/>
+                      <a:round/>
+                      <a:headEnd type="none" w="med" len="med"/>
+                      <a:tailEnd type="none" w="med" len="med"/>
+                    </a:lnB>
+                    <a:solidFill>
+                      <a:srgbClr val="FFFF00"/>
+                    </a:solidFill>
+                  </a:tcPr>
+                </a:tc>
+                <a:tc>
+                  <a:txBody>
+                    <a:bodyPr/>
+                    <a:lstStyle/>
+                    <a:p>
+                      <a:pPr algn="ctr"/>
+                      <a:endParaRPr lang="en-US" dirty="0"/>
+                    </a:p>
+                  </a:txBody>
+                  <a:tcPr>
+                    <a:lnL w="12700" cap="flat" cmpd="sng" algn="ctr">
+                      <a:solidFill>
+                        <a:scrgbClr r="0" g="0" b="0"/>
+                      </a:solidFill>
+                      <a:prstDash val="solid"/>
+                      <a:round/>
+                      <a:headEnd type="none" w="med" len="med"/>
+                      <a:tailEnd type="none" w="med" len="med"/>
+                    </a:lnL>
+                    <a:lnR w="12700" cap="flat" cmpd="sng" algn="ctr">
+                      <a:solidFill>
+                        <a:scrgbClr r="0" g="0" b="0"/>
+                      </a:solidFill>
+                      <a:prstDash val="solid"/>
+                      <a:round/>
+                      <a:headEnd type="none" w="med" len="med"/>
+                      <a:tailEnd type="none" w="med" len="med"/>
+                    </a:lnR>
+                    <a:lnT w="12700" cap="flat" cmpd="sng" algn="ctr">
+                      <a:solidFill>
+                        <a:scrgbClr r="0" g="0" b="0"/>
+                      </a:solidFill>
+                      <a:prstDash val="solid"/>
+                      <a:round/>
+                      <a:headEnd type="none" w="med" len="med"/>
+                      <a:tailEnd type="none" w="med" len="med"/>
+                    </a:lnT>
+                    <a:lnB w="12700" cap="flat" cmpd="sng" algn="ctr">
+                      <a:solidFill>
+                        <a:scrgbClr r="0" g="0" b="0"/>
+                      </a:solidFill>
+                      <a:prstDash val="solid"/>
+                      <a:round/>
+                      <a:headEnd type="none" w="med" len="med"/>
+                      <a:tailEnd type="none" w="med" len="med"/>
+                    </a:lnB>
+                    <a:solidFill>
+                      <a:srgbClr val="FFFF00"/>
+                    </a:solidFill>
+                  </a:tcPr>
+                </a:tc>
+                <a:tc>
+                  <a:txBody>
+                    <a:bodyPr/>
+                    <a:lstStyle/>
+                    <a:p>
+                      <a:pPr algn="ctr"/>
+                      <a:endParaRPr lang="en-US" dirty="0"/>
+                    </a:p>
+                  </a:txBody>
+                  <a:tcPr>
+                    <a:lnL w="12700" cap="flat" cmpd="sng" algn="ctr">
+                      <a:solidFill>
+                        <a:scrgbClr r="0" g="0" b="0"/>
+                      </a:solidFill>
+                      <a:prstDash val="solid"/>
+                      <a:round/>
+                      <a:headEnd type="none" w="med" len="med"/>
+                      <a:tailEnd type="none" w="med" len="med"/>
+                    </a:lnL>
+                    <a:lnR w="12700" cap="flat" cmpd="sng" algn="ctr">
+                      <a:solidFill>
+                        <a:scrgbClr r="0" g="0" b="0"/>
+                      </a:solidFill>
+                      <a:prstDash val="solid"/>
+                      <a:round/>
+                      <a:headEnd type="none" w="med" len="med"/>
+                      <a:tailEnd type="none" w="med" len="med"/>
+                    </a:lnR>
+                    <a:lnT w="12700" cap="flat" cmpd="sng" algn="ctr">
+                      <a:solidFill>
+                        <a:scrgbClr r="0" g="0" b="0"/>
+                      </a:solidFill>
+                      <a:prstDash val="solid"/>
+                      <a:round/>
+                      <a:headEnd type="none" w="med" len="med"/>
+                      <a:tailEnd type="none" w="med" len="med"/>
+                    </a:lnT>
+                    <a:lnB w="12700" cap="flat" cmpd="sng" algn="ctr">
+                      <a:solidFill>
+                        <a:scrgbClr r="0" g="0" b="0"/>
+                      </a:solidFill>
+                      <a:prstDash val="solid"/>
+                      <a:round/>
+                      <a:headEnd type="none" w="med" len="med"/>
+                      <a:tailEnd type="none" w="med" len="med"/>
+                    </a:lnB>
+                    <a:solidFill>
+                      <a:srgbClr val="FFFF00"/>
+                    </a:solidFill>
+                  </a:tcPr>
+                </a:tc>
+                <a:tc>
+                  <a:txBody>
+                    <a:bodyPr/>
+                    <a:lstStyle/>
+                    <a:p>
+                      <a:pPr algn="ctr"/>
+                      <a:endParaRPr lang="en-US" dirty="0"/>
+                    </a:p>
+                  </a:txBody>
+                  <a:tcPr>
+                    <a:lnL w="12700" cap="flat" cmpd="sng" algn="ctr">
+                      <a:solidFill>
+                        <a:scrgbClr r="0" g="0" b="0"/>
+                      </a:solidFill>
+                      <a:prstDash val="solid"/>
+                      <a:round/>
+                      <a:headEnd type="none" w="med" len="med"/>
+                      <a:tailEnd type="none" w="med" len="med"/>
+                    </a:lnL>
+                    <a:lnR w="12700" cap="flat" cmpd="sng" algn="ctr">
+                      <a:solidFill>
+                        <a:scrgbClr r="0" g="0" b="0"/>
+                      </a:solidFill>
+                      <a:prstDash val="solid"/>
+                      <a:round/>
+                      <a:headEnd type="none" w="med" len="med"/>
+                      <a:tailEnd type="none" w="med" len="med"/>
+                    </a:lnR>
+                    <a:lnT w="12700" cap="flat" cmpd="sng" algn="ctr">
+                      <a:solidFill>
+                        <a:scrgbClr r="0" g="0" b="0"/>
+                      </a:solidFill>
+                      <a:prstDash val="solid"/>
+                      <a:round/>
+                      <a:headEnd type="none" w="med" len="med"/>
+                      <a:tailEnd type="none" w="med" len="med"/>
+                    </a:lnT>
+                    <a:lnB w="12700" cap="flat" cmpd="sng" algn="ctr">
+                      <a:solidFill>
+                        <a:scrgbClr r="0" g="0" b="0"/>
+                      </a:solidFill>
+                      <a:prstDash val="solid"/>
+                      <a:round/>
+                      <a:headEnd type="none" w="med" len="med"/>
+                      <a:tailEnd type="none" w="med" len="med"/>
+                    </a:lnB>
+                    <a:solidFill>
+                      <a:srgbClr val="FFFF00"/>
+                    </a:solidFill>
+                  </a:tcPr>
+                </a:tc>
+              </a:tr>
+            </a:tbl>
+          </a:graphicData>
+        </a:graphic>
+      </p:graphicFrame>
+      <p:pic>
+        <p:nvPicPr>
+          <p:cNvPr id="6" name="Picture 5"/>
+          <p:cNvPicPr>
+            <a:picLocks noChangeAspect="1"/>
+          </p:cNvPicPr>
+          <p:nvPr/>
+        </p:nvPicPr>
+        <p:blipFill>
+          <a:blip r:embed="rId2"/>
+          <a:stretch>
+            <a:fillRect/>
+          </a:stretch>
+        </p:blipFill>
+        <p:spPr>
+          <a:xfrm>
+            <a:off x="2731463" y="5841728"/>
+            <a:ext cx="609600" cy="609600"/>
+          </a:xfrm>
+          <a:prstGeom prst="rect">
+            <a:avLst/>
+          </a:prstGeom>
+        </p:spPr>
+      </p:pic>
+      <p:grpSp>
+        <p:nvGrpSpPr>
+          <p:cNvPr id="14" name="Group 13"/>
+          <p:cNvGrpSpPr/>
+          <p:nvPr/>
+        </p:nvGrpSpPr>
+        <p:grpSpPr>
+          <a:xfrm>
+            <a:off x="3034713" y="4737823"/>
+            <a:ext cx="4471120" cy="1400092"/>
+            <a:chOff x="3034713" y="4737823"/>
+            <a:chExt cx="4471120" cy="1400092"/>
+          </a:xfrm>
+        </p:grpSpPr>
+        <p:pic>
+          <p:nvPicPr>
+            <p:cNvPr id="7" name="Picture 6"/>
+            <p:cNvPicPr>
+              <a:picLocks noChangeAspect="1"/>
+            </p:cNvPicPr>
+            <p:nvPr/>
+          </p:nvPicPr>
+          <p:blipFill>
+            <a:blip r:embed="rId3"/>
+            <a:stretch>
+              <a:fillRect/>
+            </a:stretch>
+          </p:blipFill>
+          <p:spPr>
+            <a:xfrm>
+              <a:off x="6870833" y="4737823"/>
+              <a:ext cx="635000" cy="476345"/>
+            </a:xfrm>
+            <a:prstGeom prst="rect">
+              <a:avLst/>
+            </a:prstGeom>
+          </p:spPr>
+        </p:pic>
+        <p:cxnSp>
+          <p:nvCxnSpPr>
+            <p:cNvPr id="9" name="Straight Arrow Connector 8"/>
+            <p:cNvCxnSpPr/>
+            <p:nvPr/>
+          </p:nvCxnSpPr>
+          <p:spPr>
+            <a:xfrm>
+              <a:off x="3440027" y="6137915"/>
+              <a:ext cx="1019552" cy="0"/>
+            </a:xfrm>
+            <a:prstGeom prst="straightConnector1">
+              <a:avLst/>
+            </a:prstGeom>
+            <a:ln>
+              <a:solidFill>
+                <a:srgbClr val="FF0000"/>
+              </a:solidFill>
+              <a:tailEnd type="arrow"/>
+            </a:ln>
+          </p:spPr>
+          <p:style>
+            <a:lnRef idx="2">
+              <a:schemeClr val="accent1"/>
+            </a:lnRef>
+            <a:fillRef idx="0">
+              <a:schemeClr val="accent1"/>
+            </a:fillRef>
+            <a:effectRef idx="1">
+              <a:schemeClr val="accent1"/>
+            </a:effectRef>
+            <a:fontRef idx="minor">
+              <a:schemeClr val="tx1"/>
+            </a:fontRef>
+          </p:style>
+        </p:cxnSp>
+        <p:cxnSp>
+          <p:nvCxnSpPr>
+            <p:cNvPr id="11" name="Straight Arrow Connector 10"/>
+            <p:cNvCxnSpPr/>
+            <p:nvPr/>
+          </p:nvCxnSpPr>
+          <p:spPr>
+            <a:xfrm flipV="1">
+              <a:off x="3034713" y="5276942"/>
+              <a:ext cx="0" cy="531796"/>
+            </a:xfrm>
+            <a:prstGeom prst="straightConnector1">
+              <a:avLst/>
+            </a:prstGeom>
+            <a:ln>
+              <a:solidFill>
+                <a:srgbClr val="FF0000"/>
+              </a:solidFill>
+              <a:tailEnd type="arrow"/>
+            </a:ln>
+          </p:spPr>
+          <p:style>
+            <a:lnRef idx="2">
+              <a:schemeClr val="accent1"/>
+            </a:lnRef>
+            <a:fillRef idx="0">
+              <a:schemeClr val="accent1"/>
+            </a:fillRef>
+            <a:effectRef idx="1">
+              <a:schemeClr val="accent1"/>
+            </a:effectRef>
+            <a:fontRef idx="minor">
+              <a:schemeClr val="tx1"/>
+            </a:fontRef>
+          </p:style>
+        </p:cxnSp>
+        <p:pic>
+          <p:nvPicPr>
+            <p:cNvPr id="13" name="Picture 12"/>
+            <p:cNvPicPr>
+              <a:picLocks noChangeAspect="1"/>
+            </p:cNvPicPr>
+            <p:nvPr/>
+          </p:nvPicPr>
+          <p:blipFill>
+            <a:blip r:embed="rId4"/>
+            <a:stretch>
+              <a:fillRect/>
+            </a:stretch>
+          </p:blipFill>
+          <p:spPr>
+            <a:xfrm>
+              <a:off x="5683248" y="5359417"/>
+              <a:ext cx="406400" cy="406400"/>
+            </a:xfrm>
+            <a:prstGeom prst="rect">
+              <a:avLst/>
+            </a:prstGeom>
+          </p:spPr>
+        </p:pic>
+      </p:grpSp>
+    </p:spTree>
+    <p:extLst>
+      <p:ext uri="{BB962C8B-B14F-4D97-AF65-F5344CB8AC3E}">
+        <p14:creationId xmlns:p14="http://schemas.microsoft.com/office/powerpoint/2010/main" val="3195680464"/>
+      </p:ext>
+    </p:extLst>
+  </p:cSld>
+  <p:clrMapOvr>
+    <a:masterClrMapping/>
+  </p:clrMapOvr>
+</p:sld>
+</file>
+
+<file path=ppt/slides/slide4.xml><?xml version="1.0" encoding="utf-8"?>
+<p:sld xmlns:a="http://schemas.openxmlformats.org/drawingml/2006/main" xmlns:r="http://schemas.openxmlformats.org/officeDocument/2006/relationships" xmlns:p="http://schemas.openxmlformats.org/presentationml/2006/main">
+  <p:cSld>
+    <p:spTree>
+      <p:nvGrpSpPr>
+        <p:cNvPr id="1" name=""/>
+        <p:cNvGrpSpPr/>
+        <p:nvPr/>
+      </p:nvGrpSpPr>
+      <p:grpSpPr>
+        <a:xfrm>
+          <a:off x="0" y="0"/>
+          <a:ext cx="0" cy="0"/>
+          <a:chOff x="0" y="0"/>
+          <a:chExt cx="0" cy="0"/>
+        </a:xfrm>
+      </p:grpSpPr>
+      <p:sp>
+        <p:nvSpPr>
+          <p:cNvPr id="2" name="Title 1"/>
+          <p:cNvSpPr>
+            <a:spLocks noGrp="1"/>
+          </p:cNvSpPr>
+          <p:nvPr>
+            <p:ph type="title"/>
+          </p:nvPr>
+        </p:nvSpPr>
+        <p:spPr/>
+        <p:txBody>
           <a:bodyPr>
             <a:normAutofit fontScale="90000"/>
           </a:bodyPr>
@@ -3437,7 +4793,7 @@
 </p:sld>
 </file>
 
-<file path=ppt/slides/slide4.xml><?xml version="1.0" encoding="utf-8"?>
+<file path=ppt/slides/slide5.xml><?xml version="1.0" encoding="utf-8"?>
 <p:sld xmlns:a="http://schemas.openxmlformats.org/drawingml/2006/main" xmlns:r="http://schemas.openxmlformats.org/officeDocument/2006/relationships" xmlns:p="http://schemas.openxmlformats.org/presentationml/2006/main">
   <p:cSld>
     <p:spTree>

</xml_diff>

<commit_message>
created a setup.py file to setup the app in new environments
</commit_message>
<xml_diff>
--- a/FRONT_END/logo_lab/FINAL_presentation.pptx
+++ b/FRONT_END/logo_lab/FINAL_presentation.pptx
@@ -3232,7 +3232,7 @@
         <p:spPr>
           <a:xfrm>
             <a:off x="1072127" y="1798009"/>
-            <a:ext cx="7043044" cy="4524315"/>
+            <a:ext cx="7043044" cy="3416320"/>
           </a:xfrm>
           <a:prstGeom prst="rect">
             <a:avLst/>
@@ -3259,7 +3259,24 @@
               <a:buFont typeface="Arial"/>
               <a:buChar char="•"/>
             </a:pPr>
-            <a:endParaRPr lang="en-US" sz="2400" dirty="0" smtClean="0"/>
+            <a:r>
+              <a:rPr lang="en-US" sz="2400" dirty="0" smtClean="0"/>
+              <a:t>Humans learn by experience, and so can machines</a:t>
+            </a:r>
+          </a:p>
+          <a:p>
+            <a:pPr marL="800100" lvl="1" indent="-342900">
+              <a:buFont typeface="Arial"/>
+              <a:buChar char="•"/>
+            </a:pPr>
+            <a:r>
+              <a:rPr lang="en-US" sz="2400" dirty="0"/>
+              <a:t>e</a:t>
+            </a:r>
+            <a:r>
+              <a:rPr lang="en-US" sz="2400" dirty="0" smtClean="0"/>
+              <a:t>xample of Hans the Horse</a:t>
+            </a:r>
           </a:p>
           <a:p>
             <a:pPr marL="342900" indent="-342900">
@@ -3268,42 +3285,8 @@
             </a:pPr>
             <a:r>
               <a:rPr lang="en-US" sz="2400" dirty="0" smtClean="0"/>
-              <a:t>Humans learn by experience, and so can machines</a:t>
-            </a:r>
-          </a:p>
-          <a:p>
-            <a:pPr marL="800100" lvl="1" indent="-342900">
-              <a:buFont typeface="Arial"/>
-              <a:buChar char="•"/>
-            </a:pPr>
-            <a:r>
-              <a:rPr lang="en-US" sz="2400" dirty="0"/>
-              <a:t>e</a:t>
-            </a:r>
-            <a:r>
-              <a:rPr lang="en-US" sz="2400" dirty="0" smtClean="0"/>
-              <a:t>xample of Hans the Horse</a:t>
-            </a:r>
-          </a:p>
-          <a:p>
-            <a:pPr lvl="1"/>
-            <a:endParaRPr lang="en-US" sz="2400" dirty="0" smtClean="0"/>
-          </a:p>
-          <a:p>
-            <a:pPr marL="342900" indent="-342900">
-              <a:buFont typeface="Arial"/>
-              <a:buChar char="•"/>
-            </a:pPr>
-            <a:r>
-              <a:rPr lang="en-US" sz="2400" dirty="0" smtClean="0"/>
               <a:t>Concept of reward/loss - Human learning, and game theory are essentially the same</a:t>
             </a:r>
-          </a:p>
-          <a:p>
-            <a:pPr marL="342900" indent="-342900">
-              <a:buFont typeface="Arial"/>
-              <a:buChar char="•"/>
-            </a:pPr>
             <a:endParaRPr lang="en-US" sz="2400" dirty="0"/>
           </a:p>
           <a:p>
@@ -3390,7 +3373,7 @@
         <p:spPr>
           <a:xfrm>
             <a:off x="1072127" y="1444317"/>
-            <a:ext cx="7043044" cy="2677656"/>
+            <a:ext cx="7043044" cy="3046988"/>
           </a:xfrm>
           <a:prstGeom prst="rect">
             <a:avLst/>
@@ -3409,13 +3392,8 @@
             </a:pPr>
             <a:r>
               <a:rPr lang="en-US" sz="2400" dirty="0" smtClean="0"/>
-              <a:t>Formulates the environment for applying ML </a:t>
-            </a:r>
-            <a:r>
-              <a:rPr lang="en-US" sz="2400" dirty="0" err="1" smtClean="0"/>
-              <a:t>algos</a:t>
-            </a:r>
-            <a:endParaRPr lang="en-US" sz="2400" dirty="0" smtClean="0"/>
+              <a:t>Formulates the environment for implementing machine algorithms in game situations</a:t>
+            </a:r>
           </a:p>
           <a:p>
             <a:pPr marL="342900" indent="-342900">
@@ -3434,23 +3412,7 @@
             </a:pPr>
             <a:r>
               <a:rPr lang="en-US" sz="2400" dirty="0" smtClean="0"/>
-              <a:t>For all the states (S = {s1, s1, s3,…}), we have a reward (R), a value (V), and a set of actions (a) – which take the state from </a:t>
-            </a:r>
-            <a:r>
-              <a:rPr lang="en-US" sz="2400" dirty="0" err="1" smtClean="0"/>
-              <a:t>si</a:t>
-            </a:r>
-            <a:r>
-              <a:rPr lang="en-US" sz="2400" dirty="0" smtClean="0"/>
-              <a:t> to </a:t>
-            </a:r>
-            <a:r>
-              <a:rPr lang="en-US" sz="2400" dirty="0" err="1" smtClean="0"/>
-              <a:t>sj</a:t>
-            </a:r>
-            <a:r>
-              <a:rPr lang="en-US" sz="2400" dirty="0" smtClean="0"/>
-              <a:t>.</a:t>
+              <a:t>For each state (S = {s1, s1, s3,…}), we have a reward (R), and a set of actions (A = {a1, a2,...})</a:t>
             </a:r>
           </a:p>
           <a:p>
@@ -3460,8 +3422,21 @@
             </a:pPr>
             <a:r>
               <a:rPr lang="en-US" sz="2400" dirty="0" smtClean="0"/>
-              <a:t>Policy (P) is a set of all actions which incorporate </a:t>
-            </a:r>
+              <a:t>Another important aspect is the concept of </a:t>
+            </a:r>
+            <a:r>
+              <a:rPr lang="en-US" sz="2400" i="1" dirty="0" smtClean="0"/>
+              <a:t>Policy </a:t>
+            </a:r>
+            <a:r>
+              <a:rPr lang="en-US" sz="2400" dirty="0" smtClean="0"/>
+              <a:t>and </a:t>
+            </a:r>
+            <a:r>
+              <a:rPr lang="en-US" sz="2400" i="1" dirty="0" smtClean="0"/>
+              <a:t>Value</a:t>
+            </a:r>
+            <a:endParaRPr lang="en-US" sz="2400" dirty="0" smtClean="0"/>
           </a:p>
           <a:p>
             <a:pPr marL="342900" indent="-342900">
@@ -4759,8 +4734,8 @@
         </p:nvSpPr>
         <p:spPr>
           <a:xfrm>
-            <a:off x="1072127" y="1444317"/>
-            <a:ext cx="7043044" cy="1569660"/>
+            <a:off x="975895" y="1698375"/>
+            <a:ext cx="7566526" cy="3046988"/>
           </a:xfrm>
           <a:prstGeom prst="rect">
             <a:avLst/>
@@ -4779,7 +4754,7 @@
             </a:pPr>
             <a:r>
               <a:rPr lang="en-US" sz="2400" dirty="0" smtClean="0"/>
-              <a:t>How do we calculate the policy? Go for the highest reward? Go for the most value?</a:t>
+              <a:t>Policy (P) is a set of actions which lead each state in the game to another particular state</a:t>
             </a:r>
           </a:p>
           <a:p>
@@ -4789,11 +4764,22 @@
             </a:pPr>
             <a:r>
               <a:rPr lang="en-US" sz="2400" dirty="0" smtClean="0"/>
-              <a:t>But, how do we calculate value? Value iteration!</a:t>
-            </a:r>
-          </a:p>
-          <a:p>
-            <a:pPr marL="800100" lvl="1" indent="-342900">
+              <a:t>Value (of a policy, P) uses the actions described by P to calculate the value of each state of the game</a:t>
+            </a:r>
+          </a:p>
+          <a:p>
+            <a:pPr marL="342900" indent="-342900">
+              <a:buFont typeface="Arial"/>
+              <a:buChar char="•"/>
+            </a:pPr>
+            <a:r>
+              <a:rPr lang="en-US" sz="2400" dirty="0" smtClean="0"/>
+              <a:t>Value, of a particular state, can be described as the potential reward (current and future expected) of being in a state.</a:t>
+            </a:r>
+            <a:endParaRPr lang="en-US" sz="2400" dirty="0" smtClean="0"/>
+          </a:p>
+          <a:p>
+            <a:pPr marL="342900" indent="-342900">
               <a:buFont typeface="Arial"/>
               <a:buChar char="•"/>
             </a:pPr>
@@ -4801,16 +4787,40 @@
           </a:p>
         </p:txBody>
       </p:sp>
-      <p:sp>
-        <p:nvSpPr>
-          <p:cNvPr id="6" name="TextBox 5"/>
+      <p:pic>
+        <p:nvPicPr>
+          <p:cNvPr id="8" name="Picture 7"/>
+          <p:cNvPicPr>
+            <a:picLocks noChangeAspect="1"/>
+          </p:cNvPicPr>
+          <p:nvPr/>
+        </p:nvPicPr>
+        <p:blipFill>
+          <a:blip r:embed="rId2"/>
+          <a:stretch>
+            <a:fillRect/>
+          </a:stretch>
+        </p:blipFill>
+        <p:spPr>
+          <a:xfrm>
+            <a:off x="1049421" y="4221229"/>
+            <a:ext cx="7493000" cy="673100"/>
+          </a:xfrm>
+          <a:prstGeom prst="rect">
+            <a:avLst/>
+          </a:prstGeom>
+        </p:spPr>
+      </p:pic>
+      <p:sp>
+        <p:nvSpPr>
+          <p:cNvPr id="10" name="TextBox 9"/>
           <p:cNvSpPr txBox="1"/>
           <p:nvPr/>
         </p:nvSpPr>
         <p:spPr>
           <a:xfrm>
-            <a:off x="1224527" y="2586942"/>
-            <a:ext cx="7043044" cy="1200328"/>
+            <a:off x="1243263" y="4512991"/>
+            <a:ext cx="7043044" cy="2492990"/>
           </a:xfrm>
           <a:prstGeom prst="rect">
             <a:avLst/>
@@ -4823,11 +4833,21 @@
           </a:bodyPr>
           <a:lstStyle/>
           <a:p>
+            <a:pPr lvl="1"/>
+            <a:endParaRPr lang="en-US" sz="2400" dirty="0" smtClean="0"/>
+          </a:p>
+          <a:p>
+            <a:r>
+              <a:rPr lang="en-US" dirty="0" smtClean="0"/>
+              <a:t>Algorithms exist (e.g. value iteration) to recursively achieve this</a:t>
+            </a:r>
+          </a:p>
+          <a:p>
             <a:pPr marL="914400" lvl="1" indent="-457200">
               <a:buAutoNum type="arabicPeriod"/>
             </a:pPr>
             <a:r>
-              <a:rPr lang="en-US" sz="2400" dirty="0" smtClean="0"/>
+              <a:rPr lang="en-US" dirty="0" smtClean="0"/>
               <a:t>Set values as rewards</a:t>
             </a:r>
           </a:p>
@@ -4836,47 +4856,25 @@
               <a:buAutoNum type="arabicPeriod"/>
             </a:pPr>
             <a:r>
-              <a:rPr lang="en-US" sz="2400" dirty="0" smtClean="0"/>
+              <a:rPr lang="en-US" dirty="0" smtClean="0"/>
               <a:t>Iteratively add to the values the weighted average of the neighboring values</a:t>
             </a:r>
           </a:p>
-        </p:txBody>
-      </p:sp>
-      <p:sp>
-        <p:nvSpPr>
-          <p:cNvPr id="7" name="TextBox 6"/>
-          <p:cNvSpPr txBox="1"/>
-          <p:nvPr/>
-        </p:nvSpPr>
-        <p:spPr>
-          <a:xfrm>
-            <a:off x="2127758" y="4998133"/>
-            <a:ext cx="5132122" cy="369332"/>
-          </a:xfrm>
-          <a:prstGeom prst="rect">
-            <a:avLst/>
-          </a:prstGeom>
-          <a:noFill/>
-        </p:spPr>
-        <p:txBody>
-          <a:bodyPr wrap="none" rtlCol="0">
-            <a:spAutoFit/>
-          </a:bodyPr>
-          <a:lstStyle/>
           <a:p>
             <a:r>
               <a:rPr lang="en-US" dirty="0" smtClean="0"/>
-              <a:t>Insert the formula and math – </a:t>
-            </a:r>
-            <a:r>
-              <a:rPr lang="en-US" dirty="0" err="1" smtClean="0"/>
-              <a:t>boltzman</a:t>
-            </a:r>
+              <a:t>But, finding the value requires knowledge of reward and probability.</a:t>
+            </a:r>
+          </a:p>
+          <a:p>
             <a:r>
               <a:rPr lang="en-US" dirty="0" smtClean="0"/>
-              <a:t> formula etc.</a:t>
-            </a:r>
-            <a:endParaRPr lang="en-US" dirty="0"/>
+              <a:t>What if we don’t have it? This is where ‘learning’ comes in</a:t>
+            </a:r>
+          </a:p>
+          <a:p>
+            <a:pPr lvl="1"/>
+            <a:endParaRPr lang="en-US" sz="2400" dirty="0" smtClean="0"/>
           </a:p>
         </p:txBody>
       </p:sp>
@@ -4961,17 +4959,7 @@
             </a:pPr>
             <a:r>
               <a:rPr lang="en-US" sz="2400" dirty="0" smtClean="0"/>
-              <a:t>Finding value</a:t>
-            </a:r>
-          </a:p>
-          <a:p>
-            <a:pPr marL="800100" lvl="1" indent="-342900">
-              <a:buFont typeface="Arial"/>
-              <a:buChar char="•"/>
-            </a:pPr>
-            <a:r>
-              <a:rPr lang="en-US" sz="2400" smtClean="0"/>
-              <a:t>Finding probability</a:t>
+              <a:t>Estimate probability by experience</a:t>
             </a:r>
           </a:p>
           <a:p>
@@ -4981,8 +4969,113 @@
             </a:pPr>
             <a:endParaRPr lang="en-US" sz="2400" dirty="0" smtClean="0"/>
           </a:p>
-        </p:txBody>
-      </p:sp>
+          <a:p>
+            <a:pPr marL="800100" lvl="1" indent="-342900">
+              <a:buFont typeface="Arial"/>
+              <a:buChar char="•"/>
+            </a:pPr>
+            <a:endParaRPr lang="en-US" sz="2400" dirty="0" smtClean="0"/>
+          </a:p>
+        </p:txBody>
+      </p:sp>
+      <p:pic>
+        <p:nvPicPr>
+          <p:cNvPr id="5" name="Picture 4"/>
+          <p:cNvPicPr>
+            <a:picLocks noChangeAspect="1"/>
+          </p:cNvPicPr>
+          <p:nvPr/>
+        </p:nvPicPr>
+        <p:blipFill>
+          <a:blip r:embed="rId2"/>
+          <a:stretch>
+            <a:fillRect/>
+          </a:stretch>
+        </p:blipFill>
+        <p:spPr>
+          <a:xfrm>
+            <a:off x="1447800" y="1918739"/>
+            <a:ext cx="6235700" cy="863600"/>
+          </a:xfrm>
+          <a:prstGeom prst="rect">
+            <a:avLst/>
+          </a:prstGeom>
+        </p:spPr>
+      </p:pic>
+      <p:sp>
+        <p:nvSpPr>
+          <p:cNvPr id="6" name="TextBox 5"/>
+          <p:cNvSpPr txBox="1"/>
+          <p:nvPr/>
+        </p:nvSpPr>
+        <p:spPr>
+          <a:xfrm>
+            <a:off x="1072127" y="2782339"/>
+            <a:ext cx="7043044" cy="1938992"/>
+          </a:xfrm>
+          <a:prstGeom prst="rect">
+            <a:avLst/>
+          </a:prstGeom>
+          <a:noFill/>
+        </p:spPr>
+        <p:txBody>
+          <a:bodyPr wrap="square" rtlCol="0">
+            <a:spAutoFit/>
+          </a:bodyPr>
+          <a:lstStyle/>
+          <a:p>
+            <a:pPr marL="800100" lvl="1" indent="-342900">
+              <a:buFont typeface="Arial"/>
+              <a:buChar char="•"/>
+            </a:pPr>
+            <a:r>
+              <a:rPr lang="en-US" sz="2400" dirty="0" smtClean="0"/>
+              <a:t>Estimate reward by taking the average of the reward experienced by the playing agents (e.g. robot) when in the particular state</a:t>
+            </a:r>
+          </a:p>
+          <a:p>
+            <a:pPr marL="800100" lvl="1" indent="-342900">
+              <a:buFont typeface="Arial"/>
+              <a:buChar char="•"/>
+            </a:pPr>
+            <a:r>
+              <a:rPr lang="en-US" sz="2400" dirty="0" smtClean="0"/>
+              <a:t>Final algorithm…</a:t>
+            </a:r>
+          </a:p>
+          <a:p>
+            <a:pPr marL="800100" lvl="1" indent="-342900">
+              <a:buFont typeface="Arial"/>
+              <a:buChar char="•"/>
+            </a:pPr>
+            <a:endParaRPr lang="en-US" sz="2400" dirty="0" smtClean="0"/>
+          </a:p>
+        </p:txBody>
+      </p:sp>
+      <p:pic>
+        <p:nvPicPr>
+          <p:cNvPr id="7" name="Picture 6"/>
+          <p:cNvPicPr>
+            <a:picLocks noChangeAspect="1"/>
+          </p:cNvPicPr>
+          <p:nvPr/>
+        </p:nvPicPr>
+        <p:blipFill>
+          <a:blip r:embed="rId3"/>
+          <a:stretch>
+            <a:fillRect/>
+          </a:stretch>
+        </p:blipFill>
+        <p:spPr>
+          <a:xfrm>
+            <a:off x="1939090" y="4411578"/>
+            <a:ext cx="5985042" cy="2332431"/>
+          </a:xfrm>
+          <a:prstGeom prst="rect">
+            <a:avLst/>
+          </a:prstGeom>
+        </p:spPr>
+      </p:pic>
     </p:spTree>
     <p:extLst>
       <p:ext uri="{BB962C8B-B14F-4D97-AF65-F5344CB8AC3E}">
@@ -5042,16 +5135,151 @@
           </a:p>
         </p:txBody>
       </p:sp>
-      <p:sp>
-        <p:nvSpPr>
-          <p:cNvPr id="4" name="TextBox 3"/>
+      <p:grpSp>
+        <p:nvGrpSpPr>
+          <p:cNvPr id="18" name="Group 17"/>
+          <p:cNvGrpSpPr/>
+          <p:nvPr/>
+        </p:nvGrpSpPr>
+        <p:grpSpPr>
+          <a:xfrm>
+            <a:off x="5864722" y="2138947"/>
+            <a:ext cx="1900994" cy="1657685"/>
+            <a:chOff x="5612057" y="2486526"/>
+            <a:chExt cx="1900994" cy="1657685"/>
+          </a:xfrm>
+        </p:grpSpPr>
+        <p:cxnSp>
+          <p:nvCxnSpPr>
+            <p:cNvPr id="5" name="Straight Connector 4"/>
+            <p:cNvCxnSpPr/>
+            <p:nvPr/>
+          </p:nvCxnSpPr>
+          <p:spPr>
+            <a:xfrm>
+              <a:off x="6269789" y="2486526"/>
+              <a:ext cx="26737" cy="1657685"/>
+            </a:xfrm>
+            <a:prstGeom prst="line">
+              <a:avLst/>
+            </a:prstGeom>
+          </p:spPr>
+          <p:style>
+            <a:lnRef idx="2">
+              <a:schemeClr val="accent1"/>
+            </a:lnRef>
+            <a:fillRef idx="0">
+              <a:schemeClr val="accent1"/>
+            </a:fillRef>
+            <a:effectRef idx="1">
+              <a:schemeClr val="accent1"/>
+            </a:effectRef>
+            <a:fontRef idx="minor">
+              <a:schemeClr val="tx1"/>
+            </a:fontRef>
+          </p:style>
+        </p:cxnSp>
+        <p:cxnSp>
+          <p:nvCxnSpPr>
+            <p:cNvPr id="6" name="Straight Connector 5"/>
+            <p:cNvCxnSpPr/>
+            <p:nvPr/>
+          </p:nvCxnSpPr>
+          <p:spPr>
+            <a:xfrm>
+              <a:off x="6815219" y="2486526"/>
+              <a:ext cx="26737" cy="1657685"/>
+            </a:xfrm>
+            <a:prstGeom prst="line">
+              <a:avLst/>
+            </a:prstGeom>
+          </p:spPr>
+          <p:style>
+            <a:lnRef idx="2">
+              <a:schemeClr val="accent1"/>
+            </a:lnRef>
+            <a:fillRef idx="0">
+              <a:schemeClr val="accent1"/>
+            </a:fillRef>
+            <a:effectRef idx="1">
+              <a:schemeClr val="accent1"/>
+            </a:effectRef>
+            <a:fontRef idx="minor">
+              <a:schemeClr val="tx1"/>
+            </a:fontRef>
+          </p:style>
+        </p:cxnSp>
+        <p:cxnSp>
+          <p:nvCxnSpPr>
+            <p:cNvPr id="7" name="Straight Connector 6"/>
+            <p:cNvCxnSpPr/>
+            <p:nvPr/>
+          </p:nvCxnSpPr>
+          <p:spPr>
+            <a:xfrm>
+              <a:off x="5612057" y="3566697"/>
+              <a:ext cx="1900994" cy="0"/>
+            </a:xfrm>
+            <a:prstGeom prst="line">
+              <a:avLst/>
+            </a:prstGeom>
+          </p:spPr>
+          <p:style>
+            <a:lnRef idx="2">
+              <a:schemeClr val="accent1"/>
+            </a:lnRef>
+            <a:fillRef idx="0">
+              <a:schemeClr val="accent1"/>
+            </a:fillRef>
+            <a:effectRef idx="1">
+              <a:schemeClr val="accent1"/>
+            </a:effectRef>
+            <a:fontRef idx="minor">
+              <a:schemeClr val="tx1"/>
+            </a:fontRef>
+          </p:style>
+        </p:cxnSp>
+        <p:cxnSp>
+          <p:nvCxnSpPr>
+            <p:cNvPr id="8" name="Straight Connector 7"/>
+            <p:cNvCxnSpPr/>
+            <p:nvPr/>
+          </p:nvCxnSpPr>
+          <p:spPr>
+            <a:xfrm>
+              <a:off x="5614739" y="3080085"/>
+              <a:ext cx="1898312" cy="0"/>
+            </a:xfrm>
+            <a:prstGeom prst="line">
+              <a:avLst/>
+            </a:prstGeom>
+          </p:spPr>
+          <p:style>
+            <a:lnRef idx="2">
+              <a:schemeClr val="accent1"/>
+            </a:lnRef>
+            <a:fillRef idx="0">
+              <a:schemeClr val="accent1"/>
+            </a:fillRef>
+            <a:effectRef idx="1">
+              <a:schemeClr val="accent1"/>
+            </a:effectRef>
+            <a:fontRef idx="minor">
+              <a:schemeClr val="tx1"/>
+            </a:fontRef>
+          </p:style>
+        </p:cxnSp>
+      </p:grpSp>
+      <p:sp>
+        <p:nvSpPr>
+          <p:cNvPr id="23" name="TextBox 22"/>
           <p:cNvSpPr txBox="1"/>
           <p:nvPr/>
         </p:nvSpPr>
         <p:spPr>
           <a:xfrm>
-            <a:off x="1484483" y="2045441"/>
-            <a:ext cx="6185343" cy="923330"/>
+            <a:off x="6608612" y="2138947"/>
+            <a:ext cx="371040" cy="523220"/>
           </a:xfrm>
           <a:prstGeom prst="rect">
             <a:avLst/>
@@ -5059,40 +5287,682 @@
           <a:noFill/>
         </p:spPr>
         <p:txBody>
-          <a:bodyPr wrap="square" rtlCol="0">
+          <a:bodyPr wrap="none" rtlCol="0">
             <a:spAutoFit/>
           </a:bodyPr>
           <a:lstStyle/>
           <a:p>
-            <a:pPr marL="285750" indent="-285750">
-              <a:buFontTx/>
-              <a:buChar char="-"/>
-            </a:pPr>
-            <a:r>
-              <a:rPr lang="en-US" dirty="0" err="1" smtClean="0"/>
-              <a:t>Minimax</a:t>
-            </a:r>
-            <a:endParaRPr lang="en-US" dirty="0" smtClean="0"/>
-          </a:p>
-          <a:p>
-            <a:pPr marL="285750" indent="-285750">
-              <a:buFontTx/>
-              <a:buChar char="-"/>
-            </a:pPr>
-            <a:r>
-              <a:rPr lang="en-US" dirty="0" smtClean="0"/>
-              <a:t>Possibly a demo, </a:t>
-            </a:r>
-          </a:p>
-          <a:p>
-            <a:pPr marL="285750" indent="-285750">
-              <a:buFontTx/>
-              <a:buChar char="-"/>
-            </a:pPr>
-            <a:endParaRPr lang="en-US" dirty="0" smtClean="0"/>
-          </a:p>
-        </p:txBody>
-      </p:sp>
+            <a:r>
+              <a:rPr lang="en-US" sz="2800" dirty="0" smtClean="0"/>
+              <a:t>X</a:t>
+            </a:r>
+            <a:endParaRPr lang="en-US" sz="2800" dirty="0"/>
+          </a:p>
+        </p:txBody>
+      </p:sp>
+      <p:sp>
+        <p:nvSpPr>
+          <p:cNvPr id="24" name="TextBox 23"/>
+          <p:cNvSpPr txBox="1"/>
+          <p:nvPr/>
+        </p:nvSpPr>
+        <p:spPr>
+          <a:xfrm>
+            <a:off x="7256379" y="3206572"/>
+            <a:ext cx="371040" cy="523220"/>
+          </a:xfrm>
+          <a:prstGeom prst="rect">
+            <a:avLst/>
+          </a:prstGeom>
+          <a:noFill/>
+        </p:spPr>
+        <p:txBody>
+          <a:bodyPr wrap="none" rtlCol="0">
+            <a:spAutoFit/>
+          </a:bodyPr>
+          <a:lstStyle/>
+          <a:p>
+            <a:r>
+              <a:rPr lang="en-US" sz="2800" dirty="0" smtClean="0"/>
+              <a:t>X</a:t>
+            </a:r>
+            <a:endParaRPr lang="en-US" sz="2800" dirty="0"/>
+          </a:p>
+        </p:txBody>
+      </p:sp>
+      <p:sp>
+        <p:nvSpPr>
+          <p:cNvPr id="25" name="TextBox 24"/>
+          <p:cNvSpPr txBox="1"/>
+          <p:nvPr/>
+        </p:nvSpPr>
+        <p:spPr>
+          <a:xfrm>
+            <a:off x="6087979" y="3211924"/>
+            <a:ext cx="422411" cy="523220"/>
+          </a:xfrm>
+          <a:prstGeom prst="rect">
+            <a:avLst/>
+          </a:prstGeom>
+          <a:noFill/>
+        </p:spPr>
+        <p:txBody>
+          <a:bodyPr wrap="none" rtlCol="0">
+            <a:spAutoFit/>
+          </a:bodyPr>
+          <a:lstStyle/>
+          <a:p>
+            <a:r>
+              <a:rPr lang="en-US" sz="2800" dirty="0" smtClean="0"/>
+              <a:t>O</a:t>
+            </a:r>
+            <a:endParaRPr lang="en-US" sz="2800" dirty="0"/>
+          </a:p>
+        </p:txBody>
+      </p:sp>
+      <p:grpSp>
+        <p:nvGrpSpPr>
+          <p:cNvPr id="79" name="Group 78"/>
+          <p:cNvGrpSpPr/>
+          <p:nvPr/>
+        </p:nvGrpSpPr>
+        <p:grpSpPr>
+          <a:xfrm>
+            <a:off x="1322508" y="4815759"/>
+            <a:ext cx="7072341" cy="1923287"/>
+            <a:chOff x="184038" y="4162563"/>
+            <a:chExt cx="7072341" cy="1923287"/>
+          </a:xfrm>
+        </p:grpSpPr>
+        <p:sp>
+          <p:nvSpPr>
+            <p:cNvPr id="27" name="TextBox 26"/>
+            <p:cNvSpPr txBox="1"/>
+            <p:nvPr/>
+          </p:nvSpPr>
+          <p:spPr>
+            <a:xfrm>
+              <a:off x="2232527" y="4162563"/>
+              <a:ext cx="1839942" cy="369332"/>
+            </a:xfrm>
+            <a:prstGeom prst="rect">
+              <a:avLst/>
+            </a:prstGeom>
+            <a:noFill/>
+          </p:spPr>
+          <p:txBody>
+            <a:bodyPr wrap="none" rtlCol="0">
+              <a:spAutoFit/>
+            </a:bodyPr>
+            <a:lstStyle/>
+            <a:p>
+              <a:r>
+                <a:rPr lang="en-US" dirty="0" smtClean="0"/>
+                <a:t>[0,0,0,0,0,0,0,0,0]</a:t>
+              </a:r>
+              <a:endParaRPr lang="en-US" dirty="0"/>
+            </a:p>
+          </p:txBody>
+        </p:sp>
+        <p:sp>
+          <p:nvSpPr>
+            <p:cNvPr id="28" name="TextBox 27"/>
+            <p:cNvSpPr txBox="1"/>
+            <p:nvPr/>
+          </p:nvSpPr>
+          <p:spPr>
+            <a:xfrm>
+              <a:off x="184038" y="4862031"/>
+              <a:ext cx="1839942" cy="369332"/>
+            </a:xfrm>
+            <a:prstGeom prst="rect">
+              <a:avLst/>
+            </a:prstGeom>
+            <a:noFill/>
+          </p:spPr>
+          <p:txBody>
+            <a:bodyPr wrap="none" rtlCol="0">
+              <a:spAutoFit/>
+            </a:bodyPr>
+            <a:lstStyle/>
+            <a:p>
+              <a:r>
+                <a:rPr lang="en-US" dirty="0" smtClean="0"/>
+                <a:t>[1,0,0,0,0,0,0,0,0]</a:t>
+              </a:r>
+              <a:endParaRPr lang="en-US" dirty="0"/>
+            </a:p>
+          </p:txBody>
+        </p:sp>
+        <p:sp>
+          <p:nvSpPr>
+            <p:cNvPr id="29" name="TextBox 28"/>
+            <p:cNvSpPr txBox="1"/>
+            <p:nvPr/>
+          </p:nvSpPr>
+          <p:spPr>
+            <a:xfrm>
+              <a:off x="2232527" y="4868961"/>
+              <a:ext cx="1839942" cy="369332"/>
+            </a:xfrm>
+            <a:prstGeom prst="rect">
+              <a:avLst/>
+            </a:prstGeom>
+            <a:noFill/>
+          </p:spPr>
+          <p:txBody>
+            <a:bodyPr wrap="none" rtlCol="0">
+              <a:spAutoFit/>
+            </a:bodyPr>
+            <a:lstStyle/>
+            <a:p>
+              <a:r>
+                <a:rPr lang="en-US" dirty="0" smtClean="0"/>
+                <a:t>[0,1,0,0,0,0,0,0,0]</a:t>
+              </a:r>
+              <a:endParaRPr lang="en-US" dirty="0"/>
+            </a:p>
+          </p:txBody>
+        </p:sp>
+        <p:sp>
+          <p:nvSpPr>
+            <p:cNvPr id="30" name="TextBox 29"/>
+            <p:cNvSpPr txBox="1"/>
+            <p:nvPr/>
+          </p:nvSpPr>
+          <p:spPr>
+            <a:xfrm>
+              <a:off x="5416437" y="4862031"/>
+              <a:ext cx="1839942" cy="369332"/>
+            </a:xfrm>
+            <a:prstGeom prst="rect">
+              <a:avLst/>
+            </a:prstGeom>
+            <a:noFill/>
+          </p:spPr>
+          <p:txBody>
+            <a:bodyPr wrap="none" rtlCol="0">
+              <a:spAutoFit/>
+            </a:bodyPr>
+            <a:lstStyle/>
+            <a:p>
+              <a:r>
+                <a:rPr lang="en-US" dirty="0" smtClean="0"/>
+                <a:t>[0,0,0,0,0,0,0,0,1]</a:t>
+              </a:r>
+              <a:endParaRPr lang="en-US" dirty="0"/>
+            </a:p>
+          </p:txBody>
+        </p:sp>
+        <p:sp>
+          <p:nvSpPr>
+            <p:cNvPr id="31" name="TextBox 30"/>
+            <p:cNvSpPr txBox="1"/>
+            <p:nvPr/>
+          </p:nvSpPr>
+          <p:spPr>
+            <a:xfrm>
+              <a:off x="4611476" y="4868961"/>
+              <a:ext cx="402311" cy="369332"/>
+            </a:xfrm>
+            <a:prstGeom prst="rect">
+              <a:avLst/>
+            </a:prstGeom>
+            <a:noFill/>
+          </p:spPr>
+          <p:txBody>
+            <a:bodyPr wrap="none" rtlCol="0">
+              <a:spAutoFit/>
+            </a:bodyPr>
+            <a:lstStyle/>
+            <a:p>
+              <a:r>
+                <a:rPr lang="en-US" dirty="0" smtClean="0"/>
+                <a:t>….</a:t>
+              </a:r>
+              <a:endParaRPr lang="en-US" dirty="0"/>
+            </a:p>
+          </p:txBody>
+        </p:sp>
+        <p:cxnSp>
+          <p:nvCxnSpPr>
+            <p:cNvPr id="44" name="Straight Arrow Connector 43"/>
+            <p:cNvCxnSpPr>
+              <a:stCxn id="29" idx="2"/>
+            </p:cNvCxnSpPr>
+            <p:nvPr/>
+          </p:nvCxnSpPr>
+          <p:spPr>
+            <a:xfrm flipH="1">
+              <a:off x="1524000" y="5238293"/>
+              <a:ext cx="1628498" cy="478225"/>
+            </a:xfrm>
+            <a:prstGeom prst="straightConnector1">
+              <a:avLst/>
+            </a:prstGeom>
+            <a:ln>
+              <a:tailEnd type="arrow"/>
+            </a:ln>
+          </p:spPr>
+          <p:style>
+            <a:lnRef idx="2">
+              <a:schemeClr val="accent1"/>
+            </a:lnRef>
+            <a:fillRef idx="0">
+              <a:schemeClr val="accent1"/>
+            </a:fillRef>
+            <a:effectRef idx="1">
+              <a:schemeClr val="accent1"/>
+            </a:effectRef>
+            <a:fontRef idx="minor">
+              <a:schemeClr val="tx1"/>
+            </a:fontRef>
+          </p:style>
+        </p:cxnSp>
+        <p:cxnSp>
+          <p:nvCxnSpPr>
+            <p:cNvPr id="47" name="Straight Arrow Connector 46"/>
+            <p:cNvCxnSpPr>
+              <a:stCxn id="27" idx="2"/>
+              <a:endCxn id="29" idx="0"/>
+            </p:cNvCxnSpPr>
+            <p:nvPr/>
+          </p:nvCxnSpPr>
+          <p:spPr>
+            <a:xfrm>
+              <a:off x="3152498" y="4531895"/>
+              <a:ext cx="0" cy="337066"/>
+            </a:xfrm>
+            <a:prstGeom prst="straightConnector1">
+              <a:avLst/>
+            </a:prstGeom>
+            <a:ln>
+              <a:tailEnd type="arrow"/>
+            </a:ln>
+          </p:spPr>
+          <p:style>
+            <a:lnRef idx="2">
+              <a:schemeClr val="accent1"/>
+            </a:lnRef>
+            <a:fillRef idx="0">
+              <a:schemeClr val="accent1"/>
+            </a:fillRef>
+            <a:effectRef idx="1">
+              <a:schemeClr val="accent1"/>
+            </a:effectRef>
+            <a:fontRef idx="minor">
+              <a:schemeClr val="tx1"/>
+            </a:fontRef>
+          </p:style>
+        </p:cxnSp>
+        <p:cxnSp>
+          <p:nvCxnSpPr>
+            <p:cNvPr id="50" name="Straight Arrow Connector 49"/>
+            <p:cNvCxnSpPr>
+              <a:stCxn id="27" idx="3"/>
+              <a:endCxn id="30" idx="0"/>
+            </p:cNvCxnSpPr>
+            <p:nvPr/>
+          </p:nvCxnSpPr>
+          <p:spPr>
+            <a:xfrm>
+              <a:off x="4072469" y="4347229"/>
+              <a:ext cx="2263939" cy="514802"/>
+            </a:xfrm>
+            <a:prstGeom prst="straightConnector1">
+              <a:avLst/>
+            </a:prstGeom>
+            <a:ln>
+              <a:tailEnd type="arrow"/>
+            </a:ln>
+          </p:spPr>
+          <p:style>
+            <a:lnRef idx="2">
+              <a:schemeClr val="accent1"/>
+            </a:lnRef>
+            <a:fillRef idx="0">
+              <a:schemeClr val="accent1"/>
+            </a:fillRef>
+            <a:effectRef idx="1">
+              <a:schemeClr val="accent1"/>
+            </a:effectRef>
+            <a:fontRef idx="minor">
+              <a:schemeClr val="tx1"/>
+            </a:fontRef>
+          </p:style>
+        </p:cxnSp>
+        <p:sp>
+          <p:nvSpPr>
+            <p:cNvPr id="55" name="TextBox 54"/>
+            <p:cNvSpPr txBox="1"/>
+            <p:nvPr/>
+          </p:nvSpPr>
+          <p:spPr>
+            <a:xfrm>
+              <a:off x="2232527" y="5716518"/>
+              <a:ext cx="1839942" cy="369332"/>
+            </a:xfrm>
+            <a:prstGeom prst="rect">
+              <a:avLst/>
+            </a:prstGeom>
+            <a:noFill/>
+          </p:spPr>
+          <p:txBody>
+            <a:bodyPr wrap="none" rtlCol="0">
+              <a:spAutoFit/>
+            </a:bodyPr>
+            <a:lstStyle/>
+            <a:p>
+              <a:r>
+                <a:rPr lang="en-US" dirty="0" smtClean="0"/>
+                <a:t>[0,1,0,0,0,0,2,0,0]</a:t>
+              </a:r>
+              <a:endParaRPr lang="en-US" dirty="0"/>
+            </a:p>
+          </p:txBody>
+        </p:sp>
+        <p:cxnSp>
+          <p:nvCxnSpPr>
+            <p:cNvPr id="56" name="Straight Arrow Connector 55"/>
+            <p:cNvCxnSpPr>
+              <a:stCxn id="29" idx="2"/>
+              <a:endCxn id="55" idx="0"/>
+            </p:cNvCxnSpPr>
+            <p:nvPr/>
+          </p:nvCxnSpPr>
+          <p:spPr>
+            <a:xfrm>
+              <a:off x="3152498" y="5238293"/>
+              <a:ext cx="0" cy="478225"/>
+            </a:xfrm>
+            <a:prstGeom prst="straightConnector1">
+              <a:avLst/>
+            </a:prstGeom>
+            <a:ln>
+              <a:tailEnd type="arrow"/>
+            </a:ln>
+          </p:spPr>
+          <p:style>
+            <a:lnRef idx="2">
+              <a:schemeClr val="accent1"/>
+            </a:lnRef>
+            <a:fillRef idx="0">
+              <a:schemeClr val="accent1"/>
+            </a:fillRef>
+            <a:effectRef idx="1">
+              <a:schemeClr val="accent1"/>
+            </a:effectRef>
+            <a:fontRef idx="minor">
+              <a:schemeClr val="tx1"/>
+            </a:fontRef>
+          </p:style>
+        </p:cxnSp>
+        <p:cxnSp>
+          <p:nvCxnSpPr>
+            <p:cNvPr id="61" name="Straight Arrow Connector 60"/>
+            <p:cNvCxnSpPr>
+              <a:stCxn id="29" idx="2"/>
+            </p:cNvCxnSpPr>
+            <p:nvPr/>
+          </p:nvCxnSpPr>
+          <p:spPr>
+            <a:xfrm>
+              <a:off x="3152498" y="5238293"/>
+              <a:ext cx="1861289" cy="478225"/>
+            </a:xfrm>
+            <a:prstGeom prst="straightConnector1">
+              <a:avLst/>
+            </a:prstGeom>
+            <a:ln>
+              <a:tailEnd type="arrow"/>
+            </a:ln>
+          </p:spPr>
+          <p:style>
+            <a:lnRef idx="2">
+              <a:schemeClr val="accent1"/>
+            </a:lnRef>
+            <a:fillRef idx="0">
+              <a:schemeClr val="accent1"/>
+            </a:fillRef>
+            <a:effectRef idx="1">
+              <a:schemeClr val="accent1"/>
+            </a:effectRef>
+            <a:fontRef idx="minor">
+              <a:schemeClr val="tx1"/>
+            </a:fontRef>
+          </p:style>
+        </p:cxnSp>
+        <p:sp>
+          <p:nvSpPr>
+            <p:cNvPr id="64" name="TextBox 63"/>
+            <p:cNvSpPr txBox="1"/>
+            <p:nvPr/>
+          </p:nvSpPr>
+          <p:spPr>
+            <a:xfrm>
+              <a:off x="4763876" y="5716518"/>
+              <a:ext cx="402311" cy="369332"/>
+            </a:xfrm>
+            <a:prstGeom prst="rect">
+              <a:avLst/>
+            </a:prstGeom>
+            <a:noFill/>
+          </p:spPr>
+          <p:txBody>
+            <a:bodyPr wrap="none" rtlCol="0">
+              <a:spAutoFit/>
+            </a:bodyPr>
+            <a:lstStyle/>
+            <a:p>
+              <a:r>
+                <a:rPr lang="en-US" dirty="0" smtClean="0"/>
+                <a:t>….</a:t>
+              </a:r>
+              <a:endParaRPr lang="en-US" dirty="0"/>
+            </a:p>
+          </p:txBody>
+        </p:sp>
+        <p:sp>
+          <p:nvSpPr>
+            <p:cNvPr id="65" name="TextBox 64"/>
+            <p:cNvSpPr txBox="1"/>
+            <p:nvPr/>
+          </p:nvSpPr>
+          <p:spPr>
+            <a:xfrm>
+              <a:off x="1322844" y="5716518"/>
+              <a:ext cx="402311" cy="369332"/>
+            </a:xfrm>
+            <a:prstGeom prst="rect">
+              <a:avLst/>
+            </a:prstGeom>
+            <a:noFill/>
+          </p:spPr>
+          <p:txBody>
+            <a:bodyPr wrap="none" rtlCol="0">
+              <a:spAutoFit/>
+            </a:bodyPr>
+            <a:lstStyle/>
+            <a:p>
+              <a:r>
+                <a:rPr lang="en-US" dirty="0" smtClean="0"/>
+                <a:t>….</a:t>
+              </a:r>
+              <a:endParaRPr lang="en-US" dirty="0"/>
+            </a:p>
+          </p:txBody>
+        </p:sp>
+        <p:cxnSp>
+          <p:nvCxnSpPr>
+            <p:cNvPr id="66" name="Straight Arrow Connector 65"/>
+            <p:cNvCxnSpPr>
+              <a:stCxn id="27" idx="1"/>
+              <a:endCxn id="28" idx="0"/>
+            </p:cNvCxnSpPr>
+            <p:nvPr/>
+          </p:nvCxnSpPr>
+          <p:spPr>
+            <a:xfrm flipH="1">
+              <a:off x="1104009" y="4347229"/>
+              <a:ext cx="1128518" cy="514802"/>
+            </a:xfrm>
+            <a:prstGeom prst="straightConnector1">
+              <a:avLst/>
+            </a:prstGeom>
+            <a:ln>
+              <a:tailEnd type="arrow"/>
+            </a:ln>
+          </p:spPr>
+          <p:style>
+            <a:lnRef idx="2">
+              <a:schemeClr val="accent1"/>
+            </a:lnRef>
+            <a:fillRef idx="0">
+              <a:schemeClr val="accent1"/>
+            </a:fillRef>
+            <a:effectRef idx="1">
+              <a:schemeClr val="accent1"/>
+            </a:effectRef>
+            <a:fontRef idx="minor">
+              <a:schemeClr val="tx1"/>
+            </a:fontRef>
+          </p:style>
+        </p:cxnSp>
+        <p:cxnSp>
+          <p:nvCxnSpPr>
+            <p:cNvPr id="69" name="Straight Arrow Connector 68"/>
+            <p:cNvCxnSpPr>
+              <a:stCxn id="28" idx="2"/>
+            </p:cNvCxnSpPr>
+            <p:nvPr/>
+          </p:nvCxnSpPr>
+          <p:spPr>
+            <a:xfrm flipH="1">
+              <a:off x="895684" y="5231363"/>
+              <a:ext cx="208325" cy="313858"/>
+            </a:xfrm>
+            <a:prstGeom prst="straightConnector1">
+              <a:avLst/>
+            </a:prstGeom>
+            <a:ln>
+              <a:tailEnd type="arrow"/>
+            </a:ln>
+          </p:spPr>
+          <p:style>
+            <a:lnRef idx="2">
+              <a:schemeClr val="accent1"/>
+            </a:lnRef>
+            <a:fillRef idx="0">
+              <a:schemeClr val="accent1"/>
+            </a:fillRef>
+            <a:effectRef idx="1">
+              <a:schemeClr val="accent1"/>
+            </a:effectRef>
+            <a:fontRef idx="minor">
+              <a:schemeClr val="tx1"/>
+            </a:fontRef>
+          </p:style>
+        </p:cxnSp>
+        <p:cxnSp>
+          <p:nvCxnSpPr>
+            <p:cNvPr id="72" name="Straight Arrow Connector 71"/>
+            <p:cNvCxnSpPr/>
+            <p:nvPr/>
+          </p:nvCxnSpPr>
+          <p:spPr>
+            <a:xfrm>
+              <a:off x="1104009" y="5238293"/>
+              <a:ext cx="99149" cy="306928"/>
+            </a:xfrm>
+            <a:prstGeom prst="straightConnector1">
+              <a:avLst/>
+            </a:prstGeom>
+            <a:ln>
+              <a:tailEnd type="arrow"/>
+            </a:ln>
+          </p:spPr>
+          <p:style>
+            <a:lnRef idx="2">
+              <a:schemeClr val="accent1"/>
+            </a:lnRef>
+            <a:fillRef idx="0">
+              <a:schemeClr val="accent1"/>
+            </a:fillRef>
+            <a:effectRef idx="1">
+              <a:schemeClr val="accent1"/>
+            </a:effectRef>
+            <a:fontRef idx="minor">
+              <a:schemeClr val="tx1"/>
+            </a:fontRef>
+          </p:style>
+        </p:cxnSp>
+        <p:cxnSp>
+          <p:nvCxnSpPr>
+            <p:cNvPr id="77" name="Straight Arrow Connector 76"/>
+            <p:cNvCxnSpPr/>
+            <p:nvPr/>
+          </p:nvCxnSpPr>
+          <p:spPr>
+            <a:xfrm flipH="1">
+              <a:off x="6188918" y="5215321"/>
+              <a:ext cx="208325" cy="313858"/>
+            </a:xfrm>
+            <a:prstGeom prst="straightConnector1">
+              <a:avLst/>
+            </a:prstGeom>
+            <a:ln>
+              <a:tailEnd type="arrow"/>
+            </a:ln>
+          </p:spPr>
+          <p:style>
+            <a:lnRef idx="2">
+              <a:schemeClr val="accent1"/>
+            </a:lnRef>
+            <a:fillRef idx="0">
+              <a:schemeClr val="accent1"/>
+            </a:fillRef>
+            <a:effectRef idx="1">
+              <a:schemeClr val="accent1"/>
+            </a:effectRef>
+            <a:fontRef idx="minor">
+              <a:schemeClr val="tx1"/>
+            </a:fontRef>
+          </p:style>
+        </p:cxnSp>
+        <p:cxnSp>
+          <p:nvCxnSpPr>
+            <p:cNvPr id="78" name="Straight Arrow Connector 77"/>
+            <p:cNvCxnSpPr/>
+            <p:nvPr/>
+          </p:nvCxnSpPr>
+          <p:spPr>
+            <a:xfrm>
+              <a:off x="6397243" y="5222251"/>
+              <a:ext cx="99149" cy="306928"/>
+            </a:xfrm>
+            <a:prstGeom prst="straightConnector1">
+              <a:avLst/>
+            </a:prstGeom>
+            <a:ln>
+              <a:tailEnd type="arrow"/>
+            </a:ln>
+          </p:spPr>
+          <p:style>
+            <a:lnRef idx="2">
+              <a:schemeClr val="accent1"/>
+            </a:lnRef>
+            <a:fillRef idx="0">
+              <a:schemeClr val="accent1"/>
+            </a:fillRef>
+            <a:effectRef idx="1">
+              <a:schemeClr val="accent1"/>
+            </a:effectRef>
+            <a:fontRef idx="minor">
+              <a:schemeClr val="tx1"/>
+            </a:fontRef>
+          </p:style>
+        </p:cxnSp>
+      </p:grpSp>
     </p:spTree>
     <p:extLst>
       <p:ext uri="{BB962C8B-B14F-4D97-AF65-F5344CB8AC3E}">
@@ -5148,14 +6018,14 @@
       </p:sp>
       <p:sp>
         <p:nvSpPr>
-          <p:cNvPr id="4" name="TextBox 3"/>
+          <p:cNvPr id="5" name="TextBox 4"/>
           <p:cNvSpPr txBox="1"/>
           <p:nvPr/>
         </p:nvSpPr>
         <p:spPr>
           <a:xfrm>
-            <a:off x="1484483" y="2045441"/>
-            <a:ext cx="6185343" cy="369332"/>
+            <a:off x="457200" y="1814776"/>
+            <a:ext cx="7798150" cy="3046988"/>
           </a:xfrm>
           <a:prstGeom prst="rect">
             <a:avLst/>
@@ -5168,13 +6038,53 @@
           </a:bodyPr>
           <a:lstStyle/>
           <a:p>
-            <a:pPr marL="285750" indent="-285750">
-              <a:buFontTx/>
-              <a:buChar char="-"/>
+            <a:pPr marL="800100" lvl="1" indent="-342900">
+              <a:buFont typeface="Arial"/>
+              <a:buChar char="•"/>
             </a:pPr>
             <a:r>
-              <a:rPr lang="en-US" dirty="0" smtClean="0"/>
-              <a:t>Key points from the presentation</a:t>
+              <a:rPr lang="en-US" sz="2400" dirty="0" smtClean="0"/>
+              <a:t>Games are everywhere</a:t>
+            </a:r>
+          </a:p>
+          <a:p>
+            <a:pPr marL="800100" lvl="1" indent="-342900">
+              <a:buFont typeface="Arial"/>
+              <a:buChar char="•"/>
+            </a:pPr>
+            <a:r>
+              <a:rPr lang="en-US" sz="2400" dirty="0" smtClean="0"/>
+              <a:t>There are optimal strategies to play games</a:t>
+            </a:r>
+          </a:p>
+          <a:p>
+            <a:pPr marL="800100" lvl="1" indent="-342900">
+              <a:buFont typeface="Arial"/>
+              <a:buChar char="•"/>
+            </a:pPr>
+            <a:r>
+              <a:rPr lang="en-US" sz="2400" dirty="0" smtClean="0"/>
+              <a:t>Humans play games making use of their experience and learning from past experiences</a:t>
+            </a:r>
+          </a:p>
+          <a:p>
+            <a:pPr marL="800100" lvl="1" indent="-342900">
+              <a:buFont typeface="Arial"/>
+              <a:buChar char="•"/>
+            </a:pPr>
+            <a:r>
+              <a:rPr lang="en-US" sz="2400" dirty="0" smtClean="0"/>
+              <a:t>Reinforcement Learning, and Markov Decision Process tries to mimic the human learning experience in to computers</a:t>
+            </a:r>
+          </a:p>
+          <a:p>
+            <a:pPr marL="800100" lvl="1" indent="-342900">
+              <a:buFont typeface="Arial"/>
+              <a:buChar char="•"/>
+            </a:pPr>
+            <a:r>
+              <a:rPr lang="en-US" sz="2400" dirty="0" smtClean="0"/>
+              <a:t>Resulting in, ‘Reinforcement Learning in Game Theory’</a:t>
             </a:r>
           </a:p>
         </p:txBody>

</xml_diff>